<commit_message>
Update Statistiek 2024-2025 -- college 8 -- schatten en betrouwbaarheid deel 2.pptx
.
</commit_message>
<xml_diff>
--- a/Danny/Onderwijs/Statistiek/2024-2025/Slides/Nieuwe slides/Statistiek 2024-2025 -- college 8 -- schatten en betrouwbaarheid deel 2.pptx
+++ b/Danny/Onderwijs/Statistiek/2024-2025/Slides/Nieuwe slides/Statistiek 2024-2025 -- college 8 -- schatten en betrouwbaarheid deel 2.pptx
@@ -428,7 +428,7 @@
               <a:pPr>
                 <a:defRPr/>
               </a:pPr>
-              <a:t>‹#›</a:t>
+              <a:t>‹nr.›</a:t>
             </a:fld>
             <a:endParaRPr lang="nl-NL"/>
           </a:p>
@@ -844,7 +844,7 @@
               <a:pPr>
                 <a:defRPr/>
               </a:pPr>
-              <a:t>‹#›</a:t>
+              <a:t>‹nr.›</a:t>
             </a:fld>
             <a:endParaRPr lang="en-US"/>
           </a:p>
@@ -4248,7 +4248,7 @@
               <a:pPr>
                 <a:defRPr/>
               </a:pPr>
-              <a:t>5 juni 2025</a:t>
+              <a:t>16 juni 2025</a:t>
             </a:fld>
             <a:endParaRPr lang="nl-NL" dirty="0"/>
           </a:p>
@@ -4383,7 +4383,7 @@
             </a:pPr>
             <a:fld id="{B65BA442-CF7C-446F-A5C6-9C80A1EA92B1}" type="datetime4">
               <a:rPr lang="nl-NL" smtClean="0"/>
-              <a:t>5 juni 2025</a:t>
+              <a:t>16 juni 2025</a:t>
             </a:fld>
             <a:endParaRPr lang="nl-NL" dirty="0"/>
           </a:p>
@@ -4540,7 +4540,7 @@
             </a:pPr>
             <a:fld id="{6ADACE4E-5F74-4A37-951C-E2AD8C0ABF31}" type="datetime4">
               <a:rPr lang="nl-NL" smtClean="0"/>
-              <a:t>5 juni 2025</a:t>
+              <a:t>16 juni 2025</a:t>
             </a:fld>
             <a:endParaRPr lang="nl-NL" dirty="0"/>
           </a:p>
@@ -4793,7 +4793,7 @@
             </a:pPr>
             <a:fld id="{8C104096-2ED3-453C-8E78-E00AE5454056}" type="datetime4">
               <a:rPr lang="nl-NL" smtClean="0"/>
-              <a:t>5 juni 2025</a:t>
+              <a:t>16 juni 2025</a:t>
             </a:fld>
             <a:endParaRPr lang="nl-NL" dirty="0"/>
           </a:p>
@@ -5190,7 +5190,7 @@
             </a:pPr>
             <a:fld id="{57509A98-FEF1-486E-836B-0182E6ED18CF}" type="datetime4">
               <a:rPr lang="nl-NL" smtClean="0"/>
-              <a:t>5 juni 2025</a:t>
+              <a:t>16 juni 2025</a:t>
             </a:fld>
             <a:endParaRPr lang="nl-NL" dirty="0"/>
           </a:p>
@@ -5273,7 +5273,7 @@
             </a:pPr>
             <a:fld id="{A45E3D14-5EDE-4B69-BCF9-7871170F920B}" type="datetime4">
               <a:rPr lang="nl-NL" smtClean="0"/>
-              <a:t>5 juni 2025</a:t>
+              <a:t>16 juni 2025</a:t>
             </a:fld>
             <a:endParaRPr lang="nl-NL" dirty="0"/>
           </a:p>
@@ -5333,7 +5333,7 @@
             </a:pPr>
             <a:fld id="{403C7BC3-7CD1-41E9-B4B5-084A2D120935}" type="datetime4">
               <a:rPr lang="nl-NL" smtClean="0"/>
-              <a:t>5 juni 2025</a:t>
+              <a:t>16 juni 2025</a:t>
             </a:fld>
             <a:endParaRPr lang="nl-NL" dirty="0"/>
           </a:p>
@@ -5575,7 +5575,7 @@
             </a:pPr>
             <a:fld id="{B9AD4273-E583-4234-8A15-01E636C03DBC}" type="datetime4">
               <a:rPr lang="nl-NL" smtClean="0"/>
-              <a:t>5 juni 2025</a:t>
+              <a:t>16 juni 2025</a:t>
             </a:fld>
             <a:endParaRPr lang="nl-NL" dirty="0"/>
           </a:p>
@@ -5968,7 +5968,7 @@
             </a:pPr>
             <a:fld id="{6DF2C121-03D7-4443-9B4B-D1ED7325FD6F}" type="datetime4">
               <a:rPr lang="nl-NL" smtClean="0"/>
-              <a:t>5 juni 2025</a:t>
+              <a:t>16 juni 2025</a:t>
             </a:fld>
             <a:endParaRPr lang="nl-NL" dirty="0"/>
           </a:p>
@@ -6103,7 +6103,7 @@
             </a:pPr>
             <a:fld id="{83790545-2047-4712-ADC2-09AB81876442}" type="datetime4">
               <a:rPr lang="nl-NL" smtClean="0"/>
-              <a:t>5 juni 2025</a:t>
+              <a:t>16 juni 2025</a:t>
             </a:fld>
             <a:endParaRPr lang="nl-NL" dirty="0"/>
           </a:p>
@@ -7907,7 +7907,7 @@
               <a:pPr eaLnBrk="0" hangingPunct="0">
                 <a:defRPr/>
               </a:pPr>
-              <a:t>‹#›</a:t>
+              <a:t>‹nr.›</a:t>
             </a:fld>
             <a:endParaRPr lang="nl-NL" sz="1000">
               <a:solidFill>
@@ -8726,7 +8726,7 @@
               <a:pPr eaLnBrk="0" hangingPunct="0">
                 <a:defRPr/>
               </a:pPr>
-              <a:t>‹#›</a:t>
+              <a:t>‹nr.›</a:t>
             </a:fld>
             <a:endParaRPr lang="nl-NL" sz="1000" dirty="0">
               <a:solidFill>
@@ -8845,7 +8845,7 @@
             </a:pPr>
             <a:fld id="{C578AD08-3C54-48F2-9382-C141D1496CCF}" type="datetime4">
               <a:rPr lang="nl-NL" smtClean="0"/>
-              <a:t>5 juni 2025</a:t>
+              <a:t>16 juni 2025</a:t>
             </a:fld>
             <a:endParaRPr lang="nl-NL" dirty="0"/>
           </a:p>
@@ -10188,13 +10188,8 @@
                 </a:r>
                 <a:r>
                   <a:rPr lang="en-US" sz="2400" dirty="0" smtClean="0"/>
-                  <a:t> </a:t>
-                </a:r>
-                <a:r>
-                  <a:rPr lang="en-US" sz="2400" dirty="0" smtClean="0"/>
-                  <a:t>.</a:t>
-                </a:r>
-                <a:endParaRPr lang="en-US" sz="2400" dirty="0" smtClean="0"/>
+                  <a:t> .</a:t>
+                </a:r>
               </a:p>
               <a:p>
                 <a:pPr marL="342900" indent="-342900">
@@ -10279,364 +10274,202 @@
                       <a:schemeClr val="tx1"/>
                     </a:solidFill>
                   </a:rPr>
-                  <a:t> met de GR:</a:t>
-                </a:r>
-              </a:p>
-              <a:p>
-                <a:pPr algn="ctr"/>
-                <a14:m>
-                  <m:oMath xmlns:m="http://schemas.openxmlformats.org/officeDocument/2006/math">
-                    <m:sSub>
-                      <m:sSubPr>
-                        <m:ctrlPr>
-                          <a:rPr lang="en-US" sz="2400" i="1" smtClean="0">
-                            <a:solidFill>
-                              <a:schemeClr val="tx1"/>
-                            </a:solidFill>
-                            <a:latin typeface="Cambria Math" panose="02040503050406030204" pitchFamily="18" charset="0"/>
-                          </a:rPr>
-                        </m:ctrlPr>
-                      </m:sSubPr>
-                      <m:e>
-                        <m:r>
-                          <a:rPr lang="en-US" sz="2400" b="0" i="1" smtClean="0">
-                            <a:solidFill>
-                              <a:schemeClr val="tx1"/>
-                            </a:solidFill>
-                            <a:latin typeface="Cambria Math" panose="02040503050406030204" pitchFamily="18" charset="0"/>
-                          </a:rPr>
-                          <m:t>𝑡</m:t>
-                        </m:r>
-                      </m:e>
-                      <m:sub>
-                        <m:r>
-                          <a:rPr lang="en-US" sz="2400" b="0" i="1" smtClean="0">
-                            <a:solidFill>
-                              <a:schemeClr val="tx1"/>
-                            </a:solidFill>
-                            <a:latin typeface="Cambria Math" panose="02040503050406030204" pitchFamily="18" charset="0"/>
-                          </a:rPr>
-                          <m:t>𝛼</m:t>
-                        </m:r>
-                        <m:r>
-                          <a:rPr lang="en-US" sz="2400" b="0" i="1" smtClean="0">
-                            <a:solidFill>
-                              <a:schemeClr val="tx1"/>
-                            </a:solidFill>
-                            <a:latin typeface="Cambria Math" panose="02040503050406030204" pitchFamily="18" charset="0"/>
-                          </a:rPr>
-                          <m:t>/2</m:t>
-                        </m:r>
-                      </m:sub>
-                    </m:sSub>
-                    <m:d>
-                      <m:dPr>
-                        <m:ctrlPr>
-                          <a:rPr lang="en-US" sz="2400" b="0" i="1" smtClean="0">
-                            <a:solidFill>
-                              <a:schemeClr val="tx1"/>
-                            </a:solidFill>
-                            <a:latin typeface="Cambria Math" panose="02040503050406030204" pitchFamily="18" charset="0"/>
-                          </a:rPr>
-                        </m:ctrlPr>
-                      </m:dPr>
-                      <m:e>
-                        <m:r>
-                          <m:rPr>
-                            <m:sty m:val="p"/>
-                          </m:rPr>
-                          <a:rPr lang="en-US" sz="2400" b="0" i="0" smtClean="0">
-                            <a:solidFill>
-                              <a:schemeClr val="tx1"/>
-                            </a:solidFill>
-                            <a:latin typeface="Cambria Math" panose="02040503050406030204" pitchFamily="18" charset="0"/>
-                          </a:rPr>
-                          <m:t>df</m:t>
-                        </m:r>
-                        <m:r>
-                          <a:rPr lang="en-US" sz="2400" b="0" i="0" smtClean="0">
-                            <a:solidFill>
-                              <a:schemeClr val="tx1"/>
-                            </a:solidFill>
-                            <a:latin typeface="Cambria Math" panose="02040503050406030204" pitchFamily="18" charset="0"/>
-                          </a:rPr>
-                          <m:t>=</m:t>
-                        </m:r>
-                        <m:r>
-                          <a:rPr lang="en-US" sz="2400" b="0" i="1" smtClean="0">
-                            <a:solidFill>
-                              <a:schemeClr val="tx1"/>
-                            </a:solidFill>
-                            <a:latin typeface="Cambria Math" panose="02040503050406030204" pitchFamily="18" charset="0"/>
-                          </a:rPr>
-                          <m:t>𝑛</m:t>
-                        </m:r>
-                        <m:r>
-                          <a:rPr lang="en-US" sz="2400" b="0" i="1" smtClean="0">
-                            <a:solidFill>
-                              <a:schemeClr val="tx1"/>
-                            </a:solidFill>
-                            <a:latin typeface="Cambria Math" panose="02040503050406030204" pitchFamily="18" charset="0"/>
-                          </a:rPr>
-                          <m:t>−1</m:t>
-                        </m:r>
-                      </m:e>
-                    </m:d>
-                    <m:r>
-                      <a:rPr lang="en-US" sz="2400" b="0" i="1" smtClean="0">
-                        <a:solidFill>
-                          <a:schemeClr val="tx1"/>
-                        </a:solidFill>
-                        <a:latin typeface="Cambria Math" panose="02040503050406030204" pitchFamily="18" charset="0"/>
-                      </a:rPr>
-                      <m:t>=</m:t>
-                    </m:r>
-                    <m:r>
-                      <m:rPr>
-                        <m:sty m:val="p"/>
-                      </m:rPr>
-                      <a:rPr lang="en-US" sz="2400" b="0" i="0" smtClean="0">
-                        <a:solidFill>
-                          <a:schemeClr val="tx1"/>
-                        </a:solidFill>
-                        <a:latin typeface="Cambria Math" panose="02040503050406030204" pitchFamily="18" charset="0"/>
-                      </a:rPr>
-                      <m:t>InvT</m:t>
-                    </m:r>
-                    <m:d>
-                      <m:dPr>
-                        <m:ctrlPr>
-                          <a:rPr lang="en-US" sz="2400" b="0" i="1" smtClean="0">
-                            <a:solidFill>
-                              <a:schemeClr val="tx1"/>
-                            </a:solidFill>
-                            <a:latin typeface="Cambria Math" panose="02040503050406030204" pitchFamily="18" charset="0"/>
-                          </a:rPr>
-                        </m:ctrlPr>
-                      </m:dPr>
-                      <m:e>
-                        <m:r>
-                          <a:rPr lang="en-US" sz="2400" b="0" i="0" smtClean="0">
-                            <a:solidFill>
-                              <a:schemeClr val="tx1"/>
-                            </a:solidFill>
-                            <a:latin typeface="Cambria Math" panose="02040503050406030204" pitchFamily="18" charset="0"/>
-                          </a:rPr>
-                          <m:t>1−</m:t>
-                        </m:r>
-                        <m:f>
-                          <m:fPr>
-                            <m:ctrlPr>
-                              <a:rPr lang="en-US" sz="2400" i="1" smtClean="0">
-                                <a:solidFill>
-                                  <a:schemeClr val="tx1"/>
-                                </a:solidFill>
-                                <a:latin typeface="Cambria Math" panose="02040503050406030204" pitchFamily="18" charset="0"/>
-                              </a:rPr>
-                            </m:ctrlPr>
-                          </m:fPr>
-                          <m:num>
-                            <m:r>
-                              <a:rPr lang="en-US" sz="2400" b="0" i="1" smtClean="0">
-                                <a:solidFill>
-                                  <a:schemeClr val="tx1"/>
-                                </a:solidFill>
-                                <a:latin typeface="Cambria Math" panose="02040503050406030204" pitchFamily="18" charset="0"/>
-                              </a:rPr>
-                              <m:t>𝛼</m:t>
-                            </m:r>
-                          </m:num>
-                          <m:den>
-                            <m:r>
-                              <a:rPr lang="en-US" sz="2400" b="0" i="1" smtClean="0">
-                                <a:solidFill>
-                                  <a:schemeClr val="tx1"/>
-                                </a:solidFill>
-                                <a:latin typeface="Cambria Math" panose="02040503050406030204" pitchFamily="18" charset="0"/>
-                              </a:rPr>
-                              <m:t>2</m:t>
-                            </m:r>
-                          </m:den>
-                        </m:f>
-                        <m:r>
-                          <a:rPr lang="en-US" sz="2400" b="0" i="1" smtClean="0">
-                            <a:solidFill>
-                              <a:schemeClr val="tx1"/>
-                            </a:solidFill>
-                            <a:latin typeface="Cambria Math" panose="02040503050406030204" pitchFamily="18" charset="0"/>
-                          </a:rPr>
-                          <m:t>;</m:t>
-                        </m:r>
-                        <m:r>
-                          <m:rPr>
-                            <m:sty m:val="p"/>
-                          </m:rPr>
-                          <a:rPr lang="en-US" sz="2400" b="0" i="0" smtClean="0">
-                            <a:solidFill>
-                              <a:schemeClr val="tx1"/>
-                            </a:solidFill>
-                            <a:latin typeface="Cambria Math" panose="02040503050406030204" pitchFamily="18" charset="0"/>
-                          </a:rPr>
-                          <m:t>df</m:t>
-                        </m:r>
-                        <m:r>
-                          <a:rPr lang="en-US" sz="2400" b="0" i="1" smtClean="0">
-                            <a:solidFill>
-                              <a:schemeClr val="tx1"/>
-                            </a:solidFill>
-                            <a:latin typeface="Cambria Math" panose="02040503050406030204" pitchFamily="18" charset="0"/>
-                          </a:rPr>
-                          <m:t>=</m:t>
-                        </m:r>
-                        <m:r>
-                          <a:rPr lang="en-US" sz="2400" b="0" i="1" smtClean="0">
-                            <a:solidFill>
-                              <a:schemeClr val="tx1"/>
-                            </a:solidFill>
-                            <a:latin typeface="Cambria Math" panose="02040503050406030204" pitchFamily="18" charset="0"/>
-                          </a:rPr>
-                          <m:t>𝑛</m:t>
-                        </m:r>
-                        <m:r>
-                          <a:rPr lang="en-US" sz="2400" b="0" i="1" smtClean="0">
-                            <a:solidFill>
-                              <a:schemeClr val="tx1"/>
-                            </a:solidFill>
-                            <a:latin typeface="Cambria Math" panose="02040503050406030204" pitchFamily="18" charset="0"/>
-                          </a:rPr>
-                          <m:t>−1</m:t>
-                        </m:r>
-                      </m:e>
-                    </m:d>
-                    <m:r>
-                      <a:rPr lang="en-US" sz="2400" b="0" i="1" smtClean="0">
-                        <a:solidFill>
-                          <a:schemeClr val="tx1"/>
-                        </a:solidFill>
-                        <a:latin typeface="Cambria Math" panose="02040503050406030204" pitchFamily="18" charset="0"/>
-                      </a:rPr>
-                      <m:t>→</m:t>
-                    </m:r>
-                    <m:sSub>
-                      <m:sSubPr>
-                        <m:ctrlPr>
-                          <a:rPr lang="en-US" sz="2400" b="0" i="1" smtClean="0">
-                            <a:solidFill>
-                              <a:schemeClr val="tx1"/>
-                            </a:solidFill>
-                            <a:latin typeface="Cambria Math" panose="02040503050406030204" pitchFamily="18" charset="0"/>
-                          </a:rPr>
-                        </m:ctrlPr>
-                      </m:sSubPr>
-                      <m:e>
-                        <m:r>
-                          <a:rPr lang="en-US" sz="2400" b="0" i="1" smtClean="0">
-                            <a:solidFill>
-                              <a:schemeClr val="tx1"/>
-                            </a:solidFill>
-                            <a:latin typeface="Cambria Math" panose="02040503050406030204" pitchFamily="18" charset="0"/>
-                          </a:rPr>
-                          <m:t>𝑡</m:t>
-                        </m:r>
-                      </m:e>
-                      <m:sub>
-                        <m:r>
-                          <a:rPr lang="en-US" sz="2400" b="0" i="1" smtClean="0">
-                            <a:solidFill>
-                              <a:schemeClr val="tx1"/>
-                            </a:solidFill>
-                            <a:latin typeface="Cambria Math" panose="02040503050406030204" pitchFamily="18" charset="0"/>
-                          </a:rPr>
-                          <m:t>0,025</m:t>
-                        </m:r>
-                      </m:sub>
-                    </m:sSub>
-                    <m:d>
-                      <m:dPr>
-                        <m:ctrlPr>
-                          <a:rPr lang="en-US" sz="2400" b="0" i="1" smtClean="0">
-                            <a:solidFill>
-                              <a:schemeClr val="tx1"/>
-                            </a:solidFill>
-                            <a:latin typeface="Cambria Math" panose="02040503050406030204" pitchFamily="18" charset="0"/>
-                          </a:rPr>
-                        </m:ctrlPr>
-                      </m:dPr>
-                      <m:e>
-                        <m:r>
-                          <a:rPr lang="en-US" sz="2400" b="0" i="1" smtClean="0">
-                            <a:solidFill>
-                              <a:schemeClr val="tx1"/>
-                            </a:solidFill>
-                            <a:latin typeface="Cambria Math" panose="02040503050406030204" pitchFamily="18" charset="0"/>
-                          </a:rPr>
-                          <m:t>10</m:t>
-                        </m:r>
-                      </m:e>
-                    </m:d>
-                    <m:r>
-                      <a:rPr lang="en-US" sz="2400" b="0" i="1" smtClean="0">
-                        <a:solidFill>
-                          <a:schemeClr val="tx1"/>
-                        </a:solidFill>
-                        <a:latin typeface="Cambria Math" panose="02040503050406030204" pitchFamily="18" charset="0"/>
-                      </a:rPr>
-                      <m:t>=</m:t>
-                    </m:r>
-                    <m:r>
-                      <m:rPr>
-                        <m:sty m:val="p"/>
-                      </m:rPr>
-                      <a:rPr lang="en-US" sz="2400" b="0" i="0" smtClean="0">
-                        <a:solidFill>
-                          <a:schemeClr val="tx1"/>
-                        </a:solidFill>
-                        <a:latin typeface="Cambria Math" panose="02040503050406030204" pitchFamily="18" charset="0"/>
-                      </a:rPr>
-                      <m:t>InvT</m:t>
-                    </m:r>
-                    <m:d>
-                      <m:dPr>
-                        <m:ctrlPr>
-                          <a:rPr lang="en-US" sz="2400" b="0" i="1" smtClean="0">
-                            <a:solidFill>
-                              <a:schemeClr val="tx1"/>
-                            </a:solidFill>
-                            <a:latin typeface="Cambria Math" panose="02040503050406030204" pitchFamily="18" charset="0"/>
-                          </a:rPr>
-                        </m:ctrlPr>
-                      </m:dPr>
-                      <m:e>
-                        <m:r>
-                          <a:rPr lang="en-US" sz="2400" b="0" i="1" smtClean="0">
-                            <a:solidFill>
-                              <a:schemeClr val="tx1"/>
-                            </a:solidFill>
-                            <a:latin typeface="Cambria Math" panose="02040503050406030204" pitchFamily="18" charset="0"/>
-                          </a:rPr>
-                          <m:t>0,975;10</m:t>
-                        </m:r>
-                      </m:e>
-                    </m:d>
-                    <m:r>
-                      <a:rPr lang="en-US" sz="2400" b="0" i="1" smtClean="0">
-                        <a:solidFill>
-                          <a:schemeClr val="tx1"/>
-                        </a:solidFill>
-                        <a:latin typeface="Cambria Math" panose="02040503050406030204" pitchFamily="18" charset="0"/>
-                      </a:rPr>
-                      <m:t>≈2,2281</m:t>
-                    </m:r>
-                  </m:oMath>
-                </a14:m>
+                  <a:t> met de </a:t>
+                </a:r>
                 <a:r>
                   <a:rPr lang="en-US" sz="2400" dirty="0" smtClean="0">
                     <a:solidFill>
                       <a:schemeClr val="tx1"/>
                     </a:solidFill>
                   </a:rPr>
-                  <a:t> </a:t>
-                </a:r>
+                  <a:t>GR (2</a:t>
+                </a:r>
+                <a:r>
+                  <a:rPr lang="en-US" sz="2400" baseline="30000" dirty="0" smtClean="0">
+                    <a:solidFill>
+                      <a:schemeClr val="tx1"/>
+                    </a:solidFill>
+                  </a:rPr>
+                  <a:t>nd</a:t>
+                </a:r>
+                <a:r>
+                  <a:rPr lang="en-US" sz="2400" dirty="0" smtClean="0">
+                    <a:solidFill>
+                      <a:schemeClr val="tx1"/>
+                    </a:solidFill>
+                  </a:rPr>
+                  <a:t>-vars-4):</a:t>
+                </a:r>
+                <a:endParaRPr lang="en-US" sz="2400" dirty="0" smtClean="0">
+                  <a:solidFill>
+                    <a:schemeClr val="tx1"/>
+                  </a:solidFill>
+                </a:endParaRPr>
+              </a:p>
+              <a:p>
+                <a:pPr algn="ctr"/>
+                <a14:m>
+                  <m:oMathPara xmlns:m="http://schemas.openxmlformats.org/officeDocument/2006/math">
+                    <m:oMathParaPr>
+                      <m:jc m:val="centerGroup"/>
+                    </m:oMathParaPr>
+                    <m:oMath xmlns:m="http://schemas.openxmlformats.org/officeDocument/2006/math">
+                      <m:r>
+                        <a:rPr lang="nl-NL" sz="2400" i="1" smtClean="0">
+                          <a:solidFill>
+                            <a:schemeClr val="tx1"/>
+                          </a:solidFill>
+                          <a:latin typeface="Cambria Math" panose="02040503050406030204" pitchFamily="18" charset="0"/>
+                        </a:rPr>
+                        <m:t>𝑡</m:t>
+                      </m:r>
+                      <m:r>
+                        <a:rPr lang="en-US" sz="2400" b="0" i="1" smtClean="0">
+                          <a:solidFill>
+                            <a:schemeClr val="tx1"/>
+                          </a:solidFill>
+                          <a:latin typeface="Cambria Math" panose="02040503050406030204" pitchFamily="18" charset="0"/>
+                        </a:rPr>
+                        <m:t>=</m:t>
+                      </m:r>
+                      <m:r>
+                        <m:rPr>
+                          <m:sty m:val="p"/>
+                        </m:rPr>
+                        <a:rPr lang="en-US" sz="2400" b="0" i="0" smtClean="0">
+                          <a:solidFill>
+                            <a:schemeClr val="tx1"/>
+                          </a:solidFill>
+                          <a:latin typeface="Cambria Math" panose="02040503050406030204" pitchFamily="18" charset="0"/>
+                        </a:rPr>
+                        <m:t>InvT</m:t>
+                      </m:r>
+                      <m:d>
+                        <m:dPr>
+                          <m:ctrlPr>
+                            <a:rPr lang="en-US" sz="2400" b="0" i="1" smtClean="0">
+                              <a:solidFill>
+                                <a:schemeClr val="tx1"/>
+                              </a:solidFill>
+                              <a:latin typeface="Cambria Math" panose="02040503050406030204" pitchFamily="18" charset="0"/>
+                            </a:rPr>
+                          </m:ctrlPr>
+                        </m:dPr>
+                        <m:e>
+                          <m:r>
+                            <a:rPr lang="nl-NL" sz="2400" b="0" i="1" smtClean="0">
+                              <a:solidFill>
+                                <a:schemeClr val="tx1"/>
+                              </a:solidFill>
+                              <a:latin typeface="Cambria Math" panose="02040503050406030204" pitchFamily="18" charset="0"/>
+                            </a:rPr>
+                            <m:t>𝑜𝑝𝑝</m:t>
+                          </m:r>
+                          <m:r>
+                            <a:rPr lang="nl-NL" sz="2400" b="0" i="1" smtClean="0">
+                              <a:solidFill>
+                                <a:schemeClr val="tx1"/>
+                              </a:solidFill>
+                              <a:latin typeface="Cambria Math" panose="02040503050406030204" pitchFamily="18" charset="0"/>
+                            </a:rPr>
+                            <m:t>=</m:t>
+                          </m:r>
+                          <m:r>
+                            <a:rPr lang="en-US" sz="2400" b="0" i="0" smtClean="0">
+                              <a:solidFill>
+                                <a:schemeClr val="tx1"/>
+                              </a:solidFill>
+                              <a:latin typeface="Cambria Math" panose="02040503050406030204" pitchFamily="18" charset="0"/>
+                            </a:rPr>
+                            <m:t>1−</m:t>
+                          </m:r>
+                          <m:f>
+                            <m:fPr>
+                              <m:ctrlPr>
+                                <a:rPr lang="en-US" sz="2400" i="1" smtClean="0">
+                                  <a:solidFill>
+                                    <a:schemeClr val="tx1"/>
+                                  </a:solidFill>
+                                  <a:latin typeface="Cambria Math" panose="02040503050406030204" pitchFamily="18" charset="0"/>
+                                </a:rPr>
+                              </m:ctrlPr>
+                            </m:fPr>
+                            <m:num>
+                              <m:r>
+                                <a:rPr lang="en-US" sz="2400" b="0" i="1" smtClean="0">
+                                  <a:solidFill>
+                                    <a:schemeClr val="tx1"/>
+                                  </a:solidFill>
+                                  <a:latin typeface="Cambria Math" panose="02040503050406030204" pitchFamily="18" charset="0"/>
+                                </a:rPr>
+                                <m:t>𝛼</m:t>
+                              </m:r>
+                            </m:num>
+                            <m:den>
+                              <m:r>
+                                <a:rPr lang="en-US" sz="2400" b="0" i="1" smtClean="0">
+                                  <a:solidFill>
+                                    <a:schemeClr val="tx1"/>
+                                  </a:solidFill>
+                                  <a:latin typeface="Cambria Math" panose="02040503050406030204" pitchFamily="18" charset="0"/>
+                                </a:rPr>
+                                <m:t>2</m:t>
+                              </m:r>
+                            </m:den>
+                          </m:f>
+                          <m:r>
+                            <a:rPr lang="en-US" sz="2400" b="0" i="1" smtClean="0">
+                              <a:solidFill>
+                                <a:schemeClr val="tx1"/>
+                              </a:solidFill>
+                              <a:latin typeface="Cambria Math" panose="02040503050406030204" pitchFamily="18" charset="0"/>
+                            </a:rPr>
+                            <m:t>;</m:t>
+                          </m:r>
+                          <m:r>
+                            <m:rPr>
+                              <m:sty m:val="p"/>
+                            </m:rPr>
+                            <a:rPr lang="en-US" sz="2400" b="0" i="0" smtClean="0">
+                              <a:solidFill>
+                                <a:schemeClr val="tx1"/>
+                              </a:solidFill>
+                              <a:latin typeface="Cambria Math" panose="02040503050406030204" pitchFamily="18" charset="0"/>
+                            </a:rPr>
+                            <m:t>df</m:t>
+                          </m:r>
+                          <m:r>
+                            <a:rPr lang="en-US" sz="2400" b="0" i="1" smtClean="0">
+                              <a:solidFill>
+                                <a:schemeClr val="tx1"/>
+                              </a:solidFill>
+                              <a:latin typeface="Cambria Math" panose="02040503050406030204" pitchFamily="18" charset="0"/>
+                            </a:rPr>
+                            <m:t>=</m:t>
+                          </m:r>
+                          <m:r>
+                            <a:rPr lang="en-US" sz="2400" b="0" i="1" smtClean="0">
+                              <a:solidFill>
+                                <a:schemeClr val="tx1"/>
+                              </a:solidFill>
+                              <a:latin typeface="Cambria Math" panose="02040503050406030204" pitchFamily="18" charset="0"/>
+                            </a:rPr>
+                            <m:t>𝑛</m:t>
+                          </m:r>
+                          <m:r>
+                            <a:rPr lang="en-US" sz="2400" b="0" i="1" smtClean="0">
+                              <a:solidFill>
+                                <a:schemeClr val="tx1"/>
+                              </a:solidFill>
+                              <a:latin typeface="Cambria Math" panose="02040503050406030204" pitchFamily="18" charset="0"/>
+                            </a:rPr>
+                            <m:t>−1</m:t>
+                          </m:r>
+                        </m:e>
+                      </m:d>
+                    </m:oMath>
+                  </m:oMathPara>
+                </a14:m>
                 <a:endParaRPr lang="en-US" sz="2400" dirty="0">
                   <a:solidFill>
                     <a:schemeClr val="tx1"/>
@@ -10710,7 +10543,7 @@
               <a:blipFill>
                 <a:blip r:embed="rId3"/>
                 <a:stretch>
-                  <a:fillRect l="-1656" t="-2296" b="-11765"/>
+                  <a:fillRect l="-1656" t="-2296" b="-4304"/>
                 </a:stretch>
               </a:blipFill>
             </p:spPr>
@@ -10719,7 +10552,7 @@
               <a:lstStyle/>
               <a:p>
                 <a:r>
-                  <a:rPr lang="nl-NL">
+                  <a:rPr lang="en-US">
                     <a:noFill/>
                   </a:rPr>
                   <a:t> </a:t>
@@ -10804,7 +10637,7 @@
                 <a:tabLst/>
                 <a:defRPr/>
               </a:pPr>
-              <a:t>5 juni 2025</a:t>
+              <a:t>16 juni 2025</a:t>
             </a:fld>
             <a:endParaRPr kumimoji="0" lang="nl-NL" sz="1100" b="0" i="0" u="none" strike="noStrike" kern="1200" cap="none" spc="0" normalizeH="0" baseline="0" noProof="0" dirty="0" smtClean="0">
               <a:ln>
@@ -11016,8 +10849,8 @@
           </p:sp>
         </mc:Fallback>
       </mc:AlternateContent>
-      <mc:AlternateContent xmlns:mc="http://schemas.openxmlformats.org/markup-compatibility/2006" xmlns:a14="http://schemas.microsoft.com/office/drawing/2010/main">
-        <mc:Choice Requires="a14">
+      <mc:AlternateContent xmlns:mc="http://schemas.openxmlformats.org/markup-compatibility/2006">
+        <mc:Choice xmlns:a14="http://schemas.microsoft.com/office/drawing/2010/main" Requires="a14">
           <p:sp>
             <p:nvSpPr>
               <p:cNvPr id="2" name="Content Placeholder 1"/>
@@ -11041,13 +10874,13 @@
                 <a14:m>
                   <m:oMath xmlns:m="http://schemas.openxmlformats.org/officeDocument/2006/math">
                     <m:r>
-                      <a:rPr lang="en-US" b="1" i="1" dirty="0">
+                      <a:rPr lang="en-US" b="1" i="1" dirty="0" smtClean="0">
                         <a:latin typeface="Cambria Math" panose="02040503050406030204" pitchFamily="18" charset="0"/>
                       </a:rPr>
                       <m:t>𝟏𝟎𝟎</m:t>
                     </m:r>
                     <m:r>
-                      <a:rPr lang="en-US" b="1" i="1" dirty="0">
+                      <a:rPr lang="en-US" b="1" i="1" dirty="0" smtClean="0">
                         <a:latin typeface="Cambria Math" panose="02040503050406030204" pitchFamily="18" charset="0"/>
                       </a:rPr>
                       <m:t>∗</m:t>
@@ -11174,13 +11007,13 @@
                         </m:e>
                         <m:sub>
                           <m:r>
-                            <a:rPr lang="en-US" b="0" i="1" smtClean="0">
+                            <a:rPr lang="nl-NL" b="0" i="1" smtClean="0">
                               <a:latin typeface="Cambria Math" panose="02040503050406030204" pitchFamily="18" charset="0"/>
                             </a:rPr>
                             <m:t>𝛼</m:t>
                           </m:r>
                           <m:r>
-                            <a:rPr lang="en-US" b="0" i="1" smtClean="0">
+                            <a:rPr lang="nl-NL" b="0" i="1" smtClean="0">
                               <a:latin typeface="Cambria Math" panose="02040503050406030204" pitchFamily="18" charset="0"/>
                             </a:rPr>
                             <m:t>/2</m:t>
@@ -11188,10 +11021,10 @@
                         </m:sub>
                       </m:sSub>
                       <m:r>
-                        <a:rPr lang="en-US" i="1">
+                        <a:rPr lang="nl-NL" i="1">
                           <a:latin typeface="Cambria Math" panose="02040503050406030204" pitchFamily="18" charset="0"/>
                         </a:rPr>
-                        <m:t>∗</m:t>
+                        <m:t>⋅</m:t>
                       </m:r>
                       <m:f>
                         <m:fPr>
@@ -11291,13 +11124,13 @@
                         </m:e>
                         <m:sub>
                           <m:r>
-                            <a:rPr lang="en-US" b="0" i="1" smtClean="0">
+                            <a:rPr lang="nl-NL" b="0" i="1" smtClean="0">
                               <a:latin typeface="Cambria Math" panose="02040503050406030204" pitchFamily="18" charset="0"/>
                             </a:rPr>
                             <m:t>𝛼</m:t>
                           </m:r>
                           <m:r>
-                            <a:rPr lang="en-US" b="0" i="1" smtClean="0">
+                            <a:rPr lang="nl-NL" b="0" i="1" smtClean="0">
                               <a:latin typeface="Cambria Math" panose="02040503050406030204" pitchFamily="18" charset="0"/>
                             </a:rPr>
                             <m:t>/2</m:t>
@@ -11305,10 +11138,10 @@
                         </m:sub>
                       </m:sSub>
                       <m:r>
-                        <a:rPr lang="en-US" i="1">
+                        <a:rPr lang="nl-NL" i="1">
                           <a:latin typeface="Cambria Math" panose="02040503050406030204" pitchFamily="18" charset="0"/>
                         </a:rPr>
-                        <m:t>∗</m:t>
+                        <m:t>⋅</m:t>
                       </m:r>
                       <m:f>
                         <m:fPr>
@@ -11348,6 +11181,12 @@
                           </m:rad>
                         </m:den>
                       </m:f>
+                      <m:r>
+                        <a:rPr lang="nl-NL" b="0" i="1" smtClean="0">
+                          <a:latin typeface="Cambria Math" panose="02040503050406030204" pitchFamily="18" charset="0"/>
+                        </a:rPr>
+                        <m:t>⋅</m:t>
+                      </m:r>
                     </m:oMath>
                   </m:oMathPara>
                 </a14:m>
@@ -11464,9 +11303,6 @@
                 </a:r>
               </a:p>
               <a:p>
-                <a:endParaRPr lang="en-US" b="1" dirty="0"/>
-              </a:p>
-              <a:p>
                 <a:pPr/>
                 <a14:m>
                   <m:oMathPara xmlns:m="http://schemas.openxmlformats.org/officeDocument/2006/math">
@@ -11498,54 +11334,17 @@
                         </a:rPr>
                         <m:t>−</m:t>
                       </m:r>
-                      <m:sSub>
-                        <m:sSubPr>
-                          <m:ctrlPr>
-                            <a:rPr lang="en-US" i="1">
-                              <a:latin typeface="Cambria Math" panose="02040503050406030204" pitchFamily="18" charset="0"/>
-                            </a:rPr>
-                          </m:ctrlPr>
-                        </m:sSubPr>
-                        <m:e>
-                          <m:r>
-                            <a:rPr lang="en-US" b="0" i="1" smtClean="0">
-                              <a:latin typeface="Cambria Math" panose="02040503050406030204" pitchFamily="18" charset="0"/>
-                            </a:rPr>
-                            <m:t>𝑡</m:t>
-                          </m:r>
-                        </m:e>
-                        <m:sub>
-                          <m:r>
-                            <a:rPr lang="en-US" b="0" i="1" smtClean="0">
-                              <a:latin typeface="Cambria Math" panose="02040503050406030204" pitchFamily="18" charset="0"/>
-                            </a:rPr>
-                            <m:t>𝛼</m:t>
-                          </m:r>
-                          <m:r>
-                            <a:rPr lang="en-US" b="0" i="1" smtClean="0">
-                              <a:latin typeface="Cambria Math" panose="02040503050406030204" pitchFamily="18" charset="0"/>
-                            </a:rPr>
-                            <m:t>/2</m:t>
-                          </m:r>
-                        </m:sub>
-                      </m:sSub>
                       <m:r>
-                        <a:rPr lang="en-US" b="0" i="1" smtClean="0">
+                        <a:rPr lang="nl-NL" i="1" smtClean="0">
                           <a:latin typeface="Cambria Math" panose="02040503050406030204" pitchFamily="18" charset="0"/>
                         </a:rPr>
-                        <m:t>(</m:t>
+                        <m:t>𝑡</m:t>
                       </m:r>
                       <m:r>
                         <a:rPr lang="en-US" b="0" i="1" smtClean="0">
                           <a:latin typeface="Cambria Math" panose="02040503050406030204" pitchFamily="18" charset="0"/>
                         </a:rPr>
-                        <m:t>𝑛</m:t>
-                      </m:r>
-                      <m:r>
-                        <a:rPr lang="en-US" b="0" i="1" smtClean="0">
-                          <a:latin typeface="Cambria Math" panose="02040503050406030204" pitchFamily="18" charset="0"/>
-                        </a:rPr>
-                        <m:t>−1)∗</m:t>
+                        <m:t>∗</m:t>
                       </m:r>
                       <m:f>
                         <m:fPr>
@@ -11627,54 +11426,17 @@
                         </a:rPr>
                         <m:t>+</m:t>
                       </m:r>
-                      <m:sSub>
-                        <m:sSubPr>
-                          <m:ctrlPr>
-                            <a:rPr lang="en-US" i="1">
-                              <a:latin typeface="Cambria Math" panose="02040503050406030204" pitchFamily="18" charset="0"/>
-                            </a:rPr>
-                          </m:ctrlPr>
-                        </m:sSubPr>
-                        <m:e>
-                          <m:r>
-                            <a:rPr lang="en-US" i="1">
-                              <a:latin typeface="Cambria Math" panose="02040503050406030204" pitchFamily="18" charset="0"/>
-                            </a:rPr>
-                            <m:t>𝑡</m:t>
-                          </m:r>
-                        </m:e>
-                        <m:sub>
-                          <m:r>
-                            <a:rPr lang="en-US" i="1">
-                              <a:latin typeface="Cambria Math" panose="02040503050406030204" pitchFamily="18" charset="0"/>
-                            </a:rPr>
-                            <m:t>𝛼</m:t>
-                          </m:r>
-                          <m:r>
-                            <a:rPr lang="en-US" i="1">
-                              <a:latin typeface="Cambria Math" panose="02040503050406030204" pitchFamily="18" charset="0"/>
-                            </a:rPr>
-                            <m:t>/2</m:t>
-                          </m:r>
-                        </m:sub>
-                      </m:sSub>
                       <m:r>
-                        <a:rPr lang="en-US" i="1">
+                        <a:rPr lang="nl-NL" b="0" i="1" smtClean="0">
                           <a:latin typeface="Cambria Math" panose="02040503050406030204" pitchFamily="18" charset="0"/>
                         </a:rPr>
-                        <m:t>(</m:t>
+                        <m:t>𝑡</m:t>
                       </m:r>
                       <m:r>
                         <a:rPr lang="en-US" i="1">
                           <a:latin typeface="Cambria Math" panose="02040503050406030204" pitchFamily="18" charset="0"/>
                         </a:rPr>
-                        <m:t>𝑛</m:t>
-                      </m:r>
-                      <m:r>
-                        <a:rPr lang="en-US" i="1">
-                          <a:latin typeface="Cambria Math" panose="02040503050406030204" pitchFamily="18" charset="0"/>
-                        </a:rPr>
-                        <m:t>−1)∗</m:t>
+                        <m:t>∗</m:t>
                       </m:r>
                       <m:f>
                         <m:fPr>
@@ -11732,13 +11494,35 @@
               </a:p>
               <a:p>
                 <a:r>
+                  <a:rPr lang="en-US" dirty="0" err="1">
+                    <a:solidFill>
+                      <a:schemeClr val="tx1"/>
+                    </a:solidFill>
+                  </a:rPr>
+                  <a:t>w</a:t>
+                </a:r>
+                <a:r>
                   <a:rPr lang="en-US" dirty="0" err="1" smtClean="0">
                     <a:solidFill>
                       <a:schemeClr val="tx1"/>
                     </a:solidFill>
                   </a:rPr>
-                  <a:t>waarbij</a:t>
-                </a:r>
+                  <a:t>aarbij</a:t>
+                </a:r>
+                <a:r>
+                  <a:rPr lang="en-US" dirty="0" smtClean="0">
+                    <a:solidFill>
+                      <a:schemeClr val="tx1"/>
+                    </a:solidFill>
+                  </a:rPr>
+                  <a:t>:</a:t>
+                </a:r>
+              </a:p>
+              <a:p>
+                <a:pPr marL="342900" indent="-342900">
+                  <a:buFont typeface="Arial" panose="020B0604020202020204" pitchFamily="34" charset="0"/>
+                  <a:buChar char="•"/>
+                </a:pPr>
                 <a:r>
                   <a:rPr lang="en-US" dirty="0" smtClean="0">
                     <a:solidFill>
@@ -11747,6 +11531,116 @@
                   </a:rPr>
                   <a:t> </a:t>
                 </a:r>
+                <a14:m>
+                  <m:oMath xmlns:m="http://schemas.openxmlformats.org/officeDocument/2006/math">
+                    <m:r>
+                      <a:rPr lang="nl-NL" i="1">
+                        <a:latin typeface="Cambria Math" panose="02040503050406030204" pitchFamily="18" charset="0"/>
+                      </a:rPr>
+                      <m:t>𝑡</m:t>
+                    </m:r>
+                    <m:r>
+                      <a:rPr lang="nl-NL" i="1">
+                        <a:latin typeface="Cambria Math" panose="02040503050406030204" pitchFamily="18" charset="0"/>
+                      </a:rPr>
+                      <m:t>=</m:t>
+                    </m:r>
+                    <m:r>
+                      <m:rPr>
+                        <m:sty m:val="p"/>
+                      </m:rPr>
+                      <a:rPr lang="nl-NL">
+                        <a:latin typeface="Cambria Math" panose="02040503050406030204" pitchFamily="18" charset="0"/>
+                      </a:rPr>
+                      <m:t>InvT</m:t>
+                    </m:r>
+                    <m:r>
+                      <a:rPr lang="nl-NL">
+                        <a:latin typeface="Cambria Math" panose="02040503050406030204" pitchFamily="18" charset="0"/>
+                      </a:rPr>
+                      <m:t>(</m:t>
+                    </m:r>
+                    <m:r>
+                      <m:rPr>
+                        <m:sty m:val="p"/>
+                      </m:rPr>
+                      <a:rPr lang="nl-NL">
+                        <a:latin typeface="Cambria Math" panose="02040503050406030204" pitchFamily="18" charset="0"/>
+                      </a:rPr>
+                      <m:t>opp</m:t>
+                    </m:r>
+                    <m:r>
+                      <a:rPr lang="nl-NL">
+                        <a:latin typeface="Cambria Math" panose="02040503050406030204" pitchFamily="18" charset="0"/>
+                      </a:rPr>
+                      <m:t>=</m:t>
+                    </m:r>
+                    <m:r>
+                      <a:rPr lang="nl-NL" b="0" i="1" smtClean="0">
+                        <a:latin typeface="Cambria Math" panose="02040503050406030204" pitchFamily="18" charset="0"/>
+                      </a:rPr>
+                      <m:t>1−</m:t>
+                    </m:r>
+                    <m:r>
+                      <a:rPr lang="nl-NL" i="1">
+                        <a:latin typeface="Cambria Math" panose="02040503050406030204" pitchFamily="18" charset="0"/>
+                      </a:rPr>
+                      <m:t>𝛼</m:t>
+                    </m:r>
+                    <m:r>
+                      <a:rPr lang="nl-NL" i="1">
+                        <a:latin typeface="Cambria Math" panose="02040503050406030204" pitchFamily="18" charset="0"/>
+                      </a:rPr>
+                      <m:t>/2;</m:t>
+                    </m:r>
+                    <m:r>
+                      <m:rPr>
+                        <m:sty m:val="p"/>
+                      </m:rPr>
+                      <a:rPr lang="nl-NL">
+                        <a:latin typeface="Cambria Math" panose="02040503050406030204" pitchFamily="18" charset="0"/>
+                      </a:rPr>
+                      <m:t>df</m:t>
+                    </m:r>
+                    <m:r>
+                      <a:rPr lang="nl-NL" i="1">
+                        <a:latin typeface="Cambria Math" panose="02040503050406030204" pitchFamily="18" charset="0"/>
+                      </a:rPr>
+                      <m:t>=</m:t>
+                    </m:r>
+                    <m:r>
+                      <a:rPr lang="nl-NL" i="1">
+                        <a:latin typeface="Cambria Math" panose="02040503050406030204" pitchFamily="18" charset="0"/>
+                      </a:rPr>
+                      <m:t>𝑛</m:t>
+                    </m:r>
+                    <m:r>
+                      <a:rPr lang="nl-NL" i="1">
+                        <a:latin typeface="Cambria Math" panose="02040503050406030204" pitchFamily="18" charset="0"/>
+                      </a:rPr>
+                      <m:t>−1)</m:t>
+                    </m:r>
+                  </m:oMath>
+                </a14:m>
+                <a:endParaRPr lang="en-US" dirty="0"/>
+              </a:p>
+              <a:p>
+                <a:pPr marL="342900" indent="-342900">
+                  <a:buFont typeface="Arial" panose="020B0604020202020204" pitchFamily="34" charset="0"/>
+                  <a:buChar char="•"/>
+                </a:pPr>
+                <a:endParaRPr lang="nl-NL" b="0" i="1" dirty="0" smtClean="0">
+                  <a:solidFill>
+                    <a:schemeClr val="tx1"/>
+                  </a:solidFill>
+                  <a:latin typeface="Cambria Math" panose="02040503050406030204" pitchFamily="18" charset="0"/>
+                </a:endParaRPr>
+              </a:p>
+              <a:p>
+                <a:pPr marL="342900" indent="-342900">
+                  <a:buFont typeface="Arial" panose="020B0604020202020204" pitchFamily="34" charset="0"/>
+                  <a:buChar char="•"/>
+                </a:pPr>
                 <a14:m>
                   <m:oMath xmlns:m="http://schemas.openxmlformats.org/officeDocument/2006/math">
                     <m:r>
@@ -12225,7 +12119,7 @@
             </p:txBody>
           </p:sp>
         </mc:Choice>
-        <mc:Fallback xmlns="">
+        <mc:Fallback>
           <p:sp>
             <p:nvSpPr>
               <p:cNvPr id="2" name="Content Placeholder 1"/>
@@ -12244,7 +12138,7 @@
               <a:blipFill>
                 <a:blip r:embed="rId3"/>
                 <a:stretch>
-                  <a:fillRect l="-1597" t="-2009"/>
+                  <a:fillRect l="-1597" t="-2009" b="-5595"/>
                 </a:stretch>
               </a:blipFill>
             </p:spPr>
@@ -12253,7 +12147,7 @@
               <a:lstStyle/>
               <a:p>
                 <a:r>
-                  <a:rPr lang="nl-NL">
+                  <a:rPr lang="en-US">
                     <a:noFill/>
                   </a:rPr>
                   <a:t> </a:t>
@@ -12338,7 +12232,7 @@
                 <a:tabLst/>
                 <a:defRPr/>
               </a:pPr>
-              <a:t>5 juni 2025</a:t>
+              <a:t>16 juni 2025</a:t>
             </a:fld>
             <a:endParaRPr kumimoji="0" lang="nl-NL" sz="1100" b="0" i="0" u="none" strike="noStrike" kern="1200" cap="none" spc="0" normalizeH="0" baseline="0" noProof="0" dirty="0" smtClean="0">
               <a:ln>
@@ -12494,8 +12388,8 @@
           </a:p>
         </p:txBody>
       </p:sp>
-      <mc:AlternateContent xmlns:mc="http://schemas.openxmlformats.org/markup-compatibility/2006">
-        <mc:Choice xmlns:a14="http://schemas.microsoft.com/office/drawing/2010/main" Requires="a14">
+      <mc:AlternateContent xmlns:mc="http://schemas.openxmlformats.org/markup-compatibility/2006" xmlns:a14="http://schemas.microsoft.com/office/drawing/2010/main">
+        <mc:Choice Requires="a14">
           <p:sp>
             <p:nvSpPr>
               <p:cNvPr id="3" name="Content Placeholder 2"/>
@@ -13179,7 +13073,6 @@
                   <a:rPr lang="en-US" sz="2000" b="1" dirty="0" smtClean="0"/>
                   <a:t>.</a:t>
                 </a:r>
-                <a:endParaRPr lang="en-US" sz="2000" b="1" dirty="0" smtClean="0"/>
               </a:p>
               <a:p>
                 <a:pPr marL="457200" indent="-457200">
@@ -13197,7 +13090,7 @@
             </p:txBody>
           </p:sp>
         </mc:Choice>
-        <mc:Fallback>
+        <mc:Fallback xmlns="">
           <p:sp>
             <p:nvSpPr>
               <p:cNvPr id="3" name="Content Placeholder 2"/>
@@ -13808,8 +13701,8 @@
           </a:p>
         </p:txBody>
       </p:sp>
-      <mc:AlternateContent xmlns:mc="http://schemas.openxmlformats.org/markup-compatibility/2006">
-        <mc:Choice xmlns:a14="http://schemas.microsoft.com/office/drawing/2010/main" Requires="a14">
+      <mc:AlternateContent xmlns:mc="http://schemas.openxmlformats.org/markup-compatibility/2006" xmlns:a14="http://schemas.microsoft.com/office/drawing/2010/main">
+        <mc:Choice Requires="a14">
           <p:sp>
             <p:nvSpPr>
               <p:cNvPr id="3" name="Content Placeholder 2"/>
@@ -14319,13 +14212,7 @@
                             <a:rPr lang="en-US" sz="2000" i="1">
                               <a:latin typeface="Cambria Math" panose="02040503050406030204" pitchFamily="18" charset="0"/>
                             </a:rPr>
-                            <m:t>+</m:t>
-                          </m:r>
-                          <m:r>
-                            <a:rPr lang="en-US" sz="2000" i="1">
-                              <a:latin typeface="Cambria Math" panose="02040503050406030204" pitchFamily="18" charset="0"/>
-                            </a:rPr>
-                            <m:t>…+</m:t>
+                            <m:t>+…+</m:t>
                           </m:r>
                           <m:sSup>
                             <m:sSupPr>
@@ -14441,7 +14328,6 @@
                 </a:endParaRPr>
               </a:p>
               <a:p>
-                <a:pPr/>
                 <a:endParaRPr lang="en-US" sz="2000" b="0" i="1" dirty="0" smtClean="0">
                   <a:latin typeface="Cambria Math" panose="02040503050406030204" pitchFamily="18" charset="0"/>
                 </a:endParaRPr>
@@ -14621,7 +14507,6 @@
                 </a:endParaRPr>
               </a:p>
               <a:p>
-                <a:pPr/>
                 <a:endParaRPr lang="en-US" sz="2000" i="1" dirty="0">
                   <a:latin typeface="Cambria Math" panose="02040503050406030204" pitchFamily="18" charset="0"/>
                 </a:endParaRPr>
@@ -14682,7 +14567,7 @@
             </p:txBody>
           </p:sp>
         </mc:Choice>
-        <mc:Fallback>
+        <mc:Fallback xmlns="">
           <p:sp>
             <p:nvSpPr>
               <p:cNvPr id="3" name="Content Placeholder 2"/>
@@ -15576,54 +15461,74 @@
                         </a:rPr>
                         <m:t>=</m:t>
                       </m:r>
-                      <m:sSub>
-                        <m:sSubPr>
-                          <m:ctrlPr>
-                            <a:rPr lang="en-US" sz="2000" b="0" i="1" smtClean="0">
-                              <a:latin typeface="Cambria Math" panose="02040503050406030204" pitchFamily="18" charset="0"/>
-                            </a:rPr>
-                          </m:ctrlPr>
-                        </m:sSubPr>
-                        <m:e>
-                          <m:r>
-                            <a:rPr lang="en-US" sz="2000" b="0" i="1" smtClean="0">
-                              <a:latin typeface="Cambria Math" panose="02040503050406030204" pitchFamily="18" charset="0"/>
-                            </a:rPr>
-                            <m:t>𝑡</m:t>
-                          </m:r>
-                        </m:e>
-                        <m:sub>
-                          <m:r>
-                            <a:rPr lang="en-US" sz="2000" b="0" i="1" smtClean="0">
-                              <a:latin typeface="Cambria Math" panose="02040503050406030204" pitchFamily="18" charset="0"/>
-                            </a:rPr>
-                            <m:t>𝛼</m:t>
-                          </m:r>
-                          <m:r>
-                            <a:rPr lang="en-US" sz="2000" b="0" i="1" smtClean="0">
-                              <a:latin typeface="Cambria Math" panose="02040503050406030204" pitchFamily="18" charset="0"/>
-                            </a:rPr>
-                            <m:t>/2</m:t>
-                          </m:r>
-                        </m:sub>
-                      </m:sSub>
+                      <m:r>
+                        <m:rPr>
+                          <m:sty m:val="p"/>
+                        </m:rPr>
+                        <a:rPr lang="en-US" sz="2000">
+                          <a:latin typeface="Cambria Math" panose="02040503050406030204" pitchFamily="18" charset="0"/>
+                        </a:rPr>
+                        <m:t>InvT</m:t>
+                      </m:r>
                       <m:d>
                         <m:dPr>
                           <m:ctrlPr>
-                            <a:rPr lang="en-US" sz="2000" b="0" i="1" smtClean="0">
+                            <a:rPr lang="en-US" sz="2000" i="1">
                               <a:latin typeface="Cambria Math" panose="02040503050406030204" pitchFamily="18" charset="0"/>
                             </a:rPr>
                           </m:ctrlPr>
                         </m:dPr>
                         <m:e>
                           <m:r>
-                            <a:rPr lang="en-US" sz="2000" b="0" i="1" smtClean="0">
+                            <m:rPr>
+                              <m:sty m:val="p"/>
+                            </m:rPr>
+                            <a:rPr lang="en-US" sz="2000">
+                              <a:latin typeface="Cambria Math" panose="02040503050406030204" pitchFamily="18" charset="0"/>
+                            </a:rPr>
+                            <m:t>opp</m:t>
+                          </m:r>
+                          <m:r>
+                            <a:rPr lang="en-US" sz="2000" i="1">
+                              <a:latin typeface="Cambria Math" panose="02040503050406030204" pitchFamily="18" charset="0"/>
+                            </a:rPr>
+                            <m:t>=1−</m:t>
+                          </m:r>
+                          <m:r>
+                            <a:rPr lang="nl-NL" sz="2000" b="0" i="1" smtClean="0">
+                              <a:latin typeface="Cambria Math" panose="02040503050406030204" pitchFamily="18" charset="0"/>
+                            </a:rPr>
+                            <m:t>𝛼</m:t>
+                          </m:r>
+                          <m:r>
+                            <a:rPr lang="nl-NL" sz="2000" b="0" i="1" smtClean="0">
+                              <a:latin typeface="Cambria Math" panose="02040503050406030204" pitchFamily="18" charset="0"/>
+                            </a:rPr>
+                            <m:t>/2;</m:t>
+                          </m:r>
+                          <m:r>
+                            <m:rPr>
+                              <m:sty m:val="p"/>
+                            </m:rPr>
+                            <a:rPr lang="nl-NL" sz="2000" b="0" i="0" smtClean="0">
+                              <a:latin typeface="Cambria Math" panose="02040503050406030204" pitchFamily="18" charset="0"/>
+                            </a:rPr>
+                            <m:t>df</m:t>
+                          </m:r>
+                          <m:r>
+                            <a:rPr lang="nl-NL" sz="2000" b="0" i="1" smtClean="0">
+                              <a:latin typeface="Cambria Math" panose="02040503050406030204" pitchFamily="18" charset="0"/>
+                            </a:rPr>
+                            <m:t>=</m:t>
+                          </m:r>
+                          <m:r>
+                            <a:rPr lang="nl-NL" sz="2000" b="0" i="1" smtClean="0">
                               <a:latin typeface="Cambria Math" panose="02040503050406030204" pitchFamily="18" charset="0"/>
                             </a:rPr>
                             <m:t>𝑛</m:t>
                           </m:r>
                           <m:r>
-                            <a:rPr lang="en-US" sz="2000" b="0" i="1" smtClean="0">
+                            <a:rPr lang="nl-NL" sz="2000" b="0" i="1" smtClean="0">
                               <a:latin typeface="Cambria Math" panose="02040503050406030204" pitchFamily="18" charset="0"/>
                             </a:rPr>
                             <m:t>−1</m:t>
@@ -15631,55 +15536,7 @@
                         </m:e>
                       </m:d>
                       <m:r>
-                        <a:rPr lang="en-US" sz="2000" b="0" i="1" smtClean="0">
-                          <a:latin typeface="Cambria Math" panose="02040503050406030204" pitchFamily="18" charset="0"/>
-                        </a:rPr>
-                        <m:t>=</m:t>
-                      </m:r>
-                      <m:sSub>
-                        <m:sSubPr>
-                          <m:ctrlPr>
-                            <a:rPr lang="en-US" sz="2000" b="0" i="1" smtClean="0">
-                              <a:latin typeface="Cambria Math" panose="02040503050406030204" pitchFamily="18" charset="0"/>
-                            </a:rPr>
-                          </m:ctrlPr>
-                        </m:sSubPr>
-                        <m:e>
-                          <m:r>
-                            <a:rPr lang="en-US" sz="2000" b="0" i="1" smtClean="0">
-                              <a:latin typeface="Cambria Math" panose="02040503050406030204" pitchFamily="18" charset="0"/>
-                            </a:rPr>
-                            <m:t>𝑡</m:t>
-                          </m:r>
-                        </m:e>
-                        <m:sub>
-                          <m:r>
-                            <a:rPr lang="en-US" sz="2000" b="0" i="1" smtClean="0">
-                              <a:latin typeface="Cambria Math" panose="02040503050406030204" pitchFamily="18" charset="0"/>
-                            </a:rPr>
-                            <m:t>0,025</m:t>
-                          </m:r>
-                        </m:sub>
-                      </m:sSub>
-                      <m:d>
-                        <m:dPr>
-                          <m:ctrlPr>
-                            <a:rPr lang="en-US" sz="2000" b="0" i="1" smtClean="0">
-                              <a:latin typeface="Cambria Math" panose="02040503050406030204" pitchFamily="18" charset="0"/>
-                            </a:rPr>
-                          </m:ctrlPr>
-                        </m:dPr>
-                        <m:e>
-                          <m:r>
-                            <a:rPr lang="en-US" sz="2000" b="0" i="1" smtClean="0">
-                              <a:latin typeface="Cambria Math" panose="02040503050406030204" pitchFamily="18" charset="0"/>
-                            </a:rPr>
-                            <m:t>7</m:t>
-                          </m:r>
-                        </m:e>
-                      </m:d>
-                      <m:r>
-                        <a:rPr lang="en-US" sz="2000" b="0" i="1" smtClean="0">
+                        <a:rPr lang="nl-NL" sz="2000" b="0" i="0" smtClean="0">
                           <a:latin typeface="Cambria Math" panose="02040503050406030204" pitchFamily="18" charset="0"/>
                         </a:rPr>
                         <m:t>=</m:t>
@@ -15703,25 +15560,31 @@
                         </m:dPr>
                         <m:e>
                           <m:r>
-                            <a:rPr lang="en-US" sz="2000" b="0" i="1" smtClean="0">
+                            <m:rPr>
+                              <m:sty m:val="p"/>
+                            </m:rPr>
+                            <a:rPr lang="en-US" sz="2000" b="0" i="0" smtClean="0">
                               <a:latin typeface="Cambria Math" panose="02040503050406030204" pitchFamily="18" charset="0"/>
                             </a:rPr>
-                            <m:t>𝑜𝑝𝑝</m:t>
+                            <m:t>opp</m:t>
                           </m:r>
                           <m:r>
                             <a:rPr lang="en-US" sz="2000" b="0" i="1" smtClean="0">
                               <a:latin typeface="Cambria Math" panose="02040503050406030204" pitchFamily="18" charset="0"/>
                             </a:rPr>
-                            <m:t>=1−0,025=0,975;</m:t>
+                            <m:t>=0,975;</m:t>
                           </m:r>
                           <m:r>
-                            <a:rPr lang="en-US" sz="2000" b="0" i="1" smtClean="0">
+                            <m:rPr>
+                              <m:sty m:val="p"/>
+                            </m:rPr>
+                            <a:rPr lang="en-US" sz="2000" b="0" i="0" smtClean="0">
                               <a:latin typeface="Cambria Math" panose="02040503050406030204" pitchFamily="18" charset="0"/>
                             </a:rPr>
-                            <m:t>𝑑𝑓</m:t>
+                            <m:t>df</m:t>
                           </m:r>
                           <m:r>
-                            <a:rPr lang="en-US" sz="2000" b="0" i="1" smtClean="0">
+                            <a:rPr lang="nl-NL" sz="2000" b="0" i="1" smtClean="0">
                               <a:latin typeface="Cambria Math" panose="02040503050406030204" pitchFamily="18" charset="0"/>
                             </a:rPr>
                             <m:t>=7</m:t>
@@ -16011,13 +15874,7 @@
                             <a:rPr lang="en-US" sz="2000" b="0" i="1" smtClean="0">
                               <a:latin typeface="Cambria Math" panose="02040503050406030204" pitchFamily="18" charset="0"/>
                             </a:rPr>
-                            <m:t>19−2,3646</m:t>
-                          </m:r>
-                          <m:r>
-                            <a:rPr lang="en-US" sz="2000" b="0" i="1" smtClean="0">
-                              <a:latin typeface="Cambria Math" panose="02040503050406030204" pitchFamily="18" charset="0"/>
-                            </a:rPr>
-                            <m:t>⋅</m:t>
+                            <m:t>19−2,3646⋅</m:t>
                           </m:r>
                           <m:f>
                             <m:fPr>
@@ -16203,11 +16060,7 @@
                 </a:r>
                 <a:r>
                   <a:rPr lang="en-US" sz="2000" b="1" dirty="0" smtClean="0"/>
-                  <a:t> </a:t>
-                </a:r>
-                <a:r>
-                  <a:rPr lang="en-US" sz="2000" b="1" dirty="0" smtClean="0"/>
-                  <a:t>17 </a:t>
+                  <a:t> 17 </a:t>
                 </a:r>
                 <a:r>
                   <a:rPr lang="en-US" sz="2000" b="1" dirty="0" err="1" smtClean="0"/>
@@ -16215,11 +16068,7 @@
                 </a:r>
                 <a:r>
                   <a:rPr lang="en-US" sz="2000" b="1" dirty="0" smtClean="0"/>
-                  <a:t> </a:t>
-                </a:r>
-                <a:r>
-                  <a:rPr lang="en-US" sz="2000" b="1" dirty="0" smtClean="0"/>
-                  <a:t>21 </a:t>
+                  <a:t> 21 </a:t>
                 </a:r>
                 <a:r>
                   <a:rPr lang="en-US" sz="2000" b="1" dirty="0" err="1" smtClean="0"/>
@@ -16249,7 +16098,7 @@
               <a:blipFill>
                 <a:blip r:embed="rId2"/>
                 <a:stretch>
-                  <a:fillRect l="-1426" r="-742" b="-11191"/>
+                  <a:fillRect l="-1426" r="-742" b="-10617"/>
                 </a:stretch>
               </a:blipFill>
             </p:spPr>
@@ -16258,7 +16107,7 @@
               <a:lstStyle/>
               <a:p>
                 <a:r>
-                  <a:rPr lang="nl-NL">
+                  <a:rPr lang="en-US">
                     <a:noFill/>
                   </a:rPr>
                   <a:t> </a:t>
@@ -16845,8 +16694,8 @@
           </a:p>
         </p:txBody>
       </p:sp>
-      <mc:AlternateContent xmlns:mc="http://schemas.openxmlformats.org/markup-compatibility/2006">
-        <mc:Choice xmlns:a14="http://schemas.microsoft.com/office/drawing/2010/main" Requires="a14">
+      <mc:AlternateContent xmlns:mc="http://schemas.openxmlformats.org/markup-compatibility/2006" xmlns:a14="http://schemas.microsoft.com/office/drawing/2010/main">
+        <mc:Choice Requires="a14">
           <p:sp>
             <p:nvSpPr>
               <p:cNvPr id="3" name="Content Placeholder 2"/>
@@ -17226,7 +17075,7 @@
             </p:txBody>
           </p:sp>
         </mc:Choice>
-        <mc:Fallback>
+        <mc:Fallback xmlns="">
           <p:sp>
             <p:nvSpPr>
               <p:cNvPr id="3" name="Content Placeholder 2"/>
@@ -17390,8 +17239,8 @@
           </a:p>
         </p:txBody>
       </p:sp>
-      <mc:AlternateContent xmlns:mc="http://schemas.openxmlformats.org/markup-compatibility/2006">
-        <mc:Choice xmlns:a14="http://schemas.microsoft.com/office/drawing/2010/main" Requires="a14">
+      <mc:AlternateContent xmlns:mc="http://schemas.openxmlformats.org/markup-compatibility/2006" xmlns:a14="http://schemas.microsoft.com/office/drawing/2010/main">
+        <mc:Choice Requires="a14">
           <p:sp>
             <p:nvSpPr>
               <p:cNvPr id="3" name="Content Placeholder 2"/>
@@ -18024,7 +17873,6 @@
                 </a:endParaRPr>
               </a:p>
               <a:p>
-                <a:pPr/>
                 <a:endParaRPr lang="en-US" sz="2000" i="1" dirty="0" smtClean="0">
                   <a:latin typeface="Cambria Math" panose="02040503050406030204" pitchFamily="18" charset="0"/>
                 </a:endParaRPr>
@@ -18077,19 +17925,7 @@
                                     <a:rPr lang="en-US" sz="2000" i="1">
                                       <a:latin typeface="Cambria Math" panose="02040503050406030204" pitchFamily="18" charset="0"/>
                                     </a:rPr>
-                                    <m:t>21</m:t>
-                                  </m:r>
-                                  <m:r>
-                                    <a:rPr lang="en-US" sz="2000" i="1">
-                                      <a:latin typeface="Cambria Math" panose="02040503050406030204" pitchFamily="18" charset="0"/>
-                                    </a:rPr>
-                                    <m:t>−</m:t>
-                                  </m:r>
-                                  <m:r>
-                                    <a:rPr lang="en-US" sz="2000" i="1">
-                                      <a:latin typeface="Cambria Math" panose="02040503050406030204" pitchFamily="18" charset="0"/>
-                                    </a:rPr>
-                                    <m:t>24</m:t>
+                                    <m:t>21−24</m:t>
                                   </m:r>
                                 </m:e>
                               </m:d>
@@ -18131,19 +17967,7 @@
                                     <a:rPr lang="en-US" sz="2000" i="1">
                                       <a:latin typeface="Cambria Math" panose="02040503050406030204" pitchFamily="18" charset="0"/>
                                     </a:rPr>
-                                    <m:t>23</m:t>
-                                  </m:r>
-                                  <m:r>
-                                    <a:rPr lang="en-US" sz="2000" i="1">
-                                      <a:latin typeface="Cambria Math" panose="02040503050406030204" pitchFamily="18" charset="0"/>
-                                    </a:rPr>
-                                    <m:t>−</m:t>
-                                  </m:r>
-                                  <m:r>
-                                    <a:rPr lang="en-US" sz="2000" i="1">
-                                      <a:latin typeface="Cambria Math" panose="02040503050406030204" pitchFamily="18" charset="0"/>
-                                    </a:rPr>
-                                    <m:t>24</m:t>
+                                    <m:t>23−24</m:t>
                                   </m:r>
                                 </m:e>
                               </m:d>
@@ -18185,19 +18009,7 @@
                                     <a:rPr lang="en-US" sz="2000" i="1">
                                       <a:latin typeface="Cambria Math" panose="02040503050406030204" pitchFamily="18" charset="0"/>
                                     </a:rPr>
-                                    <m:t>25</m:t>
-                                  </m:r>
-                                  <m:r>
-                                    <a:rPr lang="en-US" sz="2000" i="1">
-                                      <a:latin typeface="Cambria Math" panose="02040503050406030204" pitchFamily="18" charset="0"/>
-                                    </a:rPr>
-                                    <m:t>−</m:t>
-                                  </m:r>
-                                  <m:r>
-                                    <a:rPr lang="en-US" sz="2000" i="1">
-                                      <a:latin typeface="Cambria Math" panose="02040503050406030204" pitchFamily="18" charset="0"/>
-                                    </a:rPr>
-                                    <m:t>24</m:t>
+                                    <m:t>25−24</m:t>
                                   </m:r>
                                 </m:e>
                               </m:d>
@@ -18240,7 +18052,6 @@
                 </a:endParaRPr>
               </a:p>
               <a:p>
-                <a:pPr/>
                 <a:endParaRPr lang="en-US" sz="2000" i="1" dirty="0" smtClean="0">
                   <a:latin typeface="Cambria Math" panose="02040503050406030204" pitchFamily="18" charset="0"/>
                 </a:endParaRPr>
@@ -18307,7 +18118,7 @@
             </p:txBody>
           </p:sp>
         </mc:Choice>
-        <mc:Fallback>
+        <mc:Fallback xmlns="">
           <p:sp>
             <p:nvSpPr>
               <p:cNvPr id="3" name="Content Placeholder 2"/>
@@ -18751,54 +18562,74 @@
                         </a:rPr>
                         <m:t>=</m:t>
                       </m:r>
-                      <m:sSub>
-                        <m:sSubPr>
-                          <m:ctrlPr>
-                            <a:rPr lang="en-US" sz="2000" i="1">
-                              <a:latin typeface="Cambria Math" panose="02040503050406030204" pitchFamily="18" charset="0"/>
-                            </a:rPr>
-                          </m:ctrlPr>
-                        </m:sSubPr>
-                        <m:e>
-                          <m:r>
-                            <a:rPr lang="en-US" sz="2000" i="1">
-                              <a:latin typeface="Cambria Math" panose="02040503050406030204" pitchFamily="18" charset="0"/>
-                            </a:rPr>
-                            <m:t>𝑡</m:t>
-                          </m:r>
-                        </m:e>
-                        <m:sub>
-                          <m:r>
-                            <a:rPr lang="en-US" sz="2000" i="1">
-                              <a:latin typeface="Cambria Math" panose="02040503050406030204" pitchFamily="18" charset="0"/>
-                            </a:rPr>
-                            <m:t>𝛼</m:t>
-                          </m:r>
-                          <m:r>
-                            <a:rPr lang="en-US" sz="2000" i="1">
-                              <a:latin typeface="Cambria Math" panose="02040503050406030204" pitchFamily="18" charset="0"/>
-                            </a:rPr>
-                            <m:t>/2</m:t>
-                          </m:r>
-                        </m:sub>
-                      </m:sSub>
+                      <m:r>
+                        <m:rPr>
+                          <m:sty m:val="p"/>
+                        </m:rPr>
+                        <a:rPr lang="nl-NL" sz="2000" b="0" i="0" smtClean="0">
+                          <a:latin typeface="Cambria Math" panose="02040503050406030204" pitchFamily="18" charset="0"/>
+                        </a:rPr>
+                        <m:t>InvT</m:t>
+                      </m:r>
                       <m:d>
                         <m:dPr>
                           <m:ctrlPr>
-                            <a:rPr lang="en-US" sz="2000" i="1">
+                            <a:rPr lang="nl-NL" sz="2000" b="0" i="0" smtClean="0">
                               <a:latin typeface="Cambria Math" panose="02040503050406030204" pitchFamily="18" charset="0"/>
                             </a:rPr>
                           </m:ctrlPr>
                         </m:dPr>
                         <m:e>
                           <m:r>
-                            <a:rPr lang="en-US" sz="2000" i="1">
+                            <m:rPr>
+                              <m:sty m:val="p"/>
+                            </m:rPr>
+                            <a:rPr lang="nl-NL" sz="2000" b="0" i="0" smtClean="0">
+                              <a:latin typeface="Cambria Math" panose="02040503050406030204" pitchFamily="18" charset="0"/>
+                            </a:rPr>
+                            <m:t>opp</m:t>
+                          </m:r>
+                          <m:r>
+                            <a:rPr lang="nl-NL" sz="2000" b="0" i="0" smtClean="0">
+                              <a:latin typeface="Cambria Math" panose="02040503050406030204" pitchFamily="18" charset="0"/>
+                            </a:rPr>
+                            <m:t>=1−</m:t>
+                          </m:r>
+                          <m:r>
+                            <a:rPr lang="nl-NL" sz="2000" b="0" i="1" smtClean="0">
+                              <a:latin typeface="Cambria Math" panose="02040503050406030204" pitchFamily="18" charset="0"/>
+                            </a:rPr>
+                            <m:t>𝛼</m:t>
+                          </m:r>
+                          <m:r>
+                            <a:rPr lang="nl-NL" sz="2000" b="0" i="1" smtClean="0">
+                              <a:latin typeface="Cambria Math" panose="02040503050406030204" pitchFamily="18" charset="0"/>
+                            </a:rPr>
+                            <m:t>/2;</m:t>
+                          </m:r>
+                          <m:r>
+                            <m:rPr>
+                              <m:sty m:val="p"/>
+                            </m:rPr>
+                            <a:rPr lang="nl-NL" sz="2000" b="0" i="0" smtClean="0">
+                              <a:latin typeface="Cambria Math" panose="02040503050406030204" pitchFamily="18" charset="0"/>
+                            </a:rPr>
+                            <m:t>df</m:t>
+                          </m:r>
+                          <m:r>
+                            <a:rPr lang="nl-NL" sz="2000" b="0" i="0" smtClean="0">
+                              <a:latin typeface="Cambria Math" panose="02040503050406030204" pitchFamily="18" charset="0"/>
+                            </a:rPr>
+                            <m:t>=</m:t>
+                          </m:r>
+                          <m:r>
+                            <a:rPr lang="nl-NL" sz="2000" b="0" i="1" smtClean="0">
                               <a:latin typeface="Cambria Math" panose="02040503050406030204" pitchFamily="18" charset="0"/>
                             </a:rPr>
                             <m:t>𝑛</m:t>
                           </m:r>
                           <m:r>
-                            <a:rPr lang="en-US" sz="2000" i="1">
+                            <a:rPr lang="nl-NL" sz="2000" b="0" i="1" smtClean="0">
                               <a:latin typeface="Cambria Math" panose="02040503050406030204" pitchFamily="18" charset="0"/>
                             </a:rPr>
                             <m:t>−1</m:t>
@@ -18806,55 +18637,7 @@
                         </m:e>
                       </m:d>
                       <m:r>
-                        <a:rPr lang="en-US" sz="2000" i="1">
-                          <a:latin typeface="Cambria Math" panose="02040503050406030204" pitchFamily="18" charset="0"/>
-                        </a:rPr>
-                        <m:t>=</m:t>
-                      </m:r>
-                      <m:sSub>
-                        <m:sSubPr>
-                          <m:ctrlPr>
-                            <a:rPr lang="en-US" sz="2000" i="1">
-                              <a:latin typeface="Cambria Math" panose="02040503050406030204" pitchFamily="18" charset="0"/>
-                            </a:rPr>
-                          </m:ctrlPr>
-                        </m:sSubPr>
-                        <m:e>
-                          <m:r>
-                            <a:rPr lang="en-US" sz="2000" i="1">
-                              <a:latin typeface="Cambria Math" panose="02040503050406030204" pitchFamily="18" charset="0"/>
-                            </a:rPr>
-                            <m:t>𝑡</m:t>
-                          </m:r>
-                        </m:e>
-                        <m:sub>
-                          <m:r>
-                            <a:rPr lang="en-US" sz="2000" i="1">
-                              <a:latin typeface="Cambria Math" panose="02040503050406030204" pitchFamily="18" charset="0"/>
-                            </a:rPr>
-                            <m:t>0,025</m:t>
-                          </m:r>
-                        </m:sub>
-                      </m:sSub>
-                      <m:d>
-                        <m:dPr>
-                          <m:ctrlPr>
-                            <a:rPr lang="en-US" sz="2000" i="1">
-                              <a:latin typeface="Cambria Math" panose="02040503050406030204" pitchFamily="18" charset="0"/>
-                            </a:rPr>
-                          </m:ctrlPr>
-                        </m:dPr>
-                        <m:e>
-                          <m:r>
-                            <a:rPr lang="en-US" sz="2000" b="0" i="1" smtClean="0">
-                              <a:latin typeface="Cambria Math" panose="02040503050406030204" pitchFamily="18" charset="0"/>
-                            </a:rPr>
-                            <m:t>5</m:t>
-                          </m:r>
-                        </m:e>
-                      </m:d>
-                      <m:r>
-                        <a:rPr lang="en-US" sz="2000" i="1">
+                        <a:rPr lang="nl-NL" sz="2000" b="0" i="1" smtClean="0">
                           <a:latin typeface="Cambria Math" panose="02040503050406030204" pitchFamily="18" charset="0"/>
                         </a:rPr>
                         <m:t>=</m:t>
@@ -18878,10 +18661,13 @@
                         </m:dPr>
                         <m:e>
                           <m:r>
-                            <a:rPr lang="en-US" sz="2000" i="1">
+                            <m:rPr>
+                              <m:sty m:val="p"/>
+                            </m:rPr>
+                            <a:rPr lang="en-US" sz="2000" i="0">
                               <a:latin typeface="Cambria Math" panose="02040503050406030204" pitchFamily="18" charset="0"/>
                             </a:rPr>
-                            <m:t>𝑜𝑝𝑝</m:t>
+                            <m:t>opp</m:t>
                           </m:r>
                           <m:r>
                             <a:rPr lang="en-US" sz="2000" i="1">
@@ -18890,16 +18676,25 @@
                             <m:t>=1−0,025=0,975;</m:t>
                           </m:r>
                           <m:r>
-                            <a:rPr lang="en-US" sz="2000" i="1">
+                            <m:rPr>
+                              <m:sty m:val="p"/>
+                            </m:rPr>
+                            <a:rPr lang="en-US" sz="2000" i="0">
                               <a:latin typeface="Cambria Math" panose="02040503050406030204" pitchFamily="18" charset="0"/>
                             </a:rPr>
-                            <m:t>𝑑𝑓</m:t>
+                            <m:t>df</m:t>
                           </m:r>
                           <m:r>
                             <a:rPr lang="en-US" sz="2000" i="1">
                               <a:latin typeface="Cambria Math" panose="02040503050406030204" pitchFamily="18" charset="0"/>
                             </a:rPr>
-                            <m:t>=5</m:t>
+                            <m:t>=</m:t>
+                          </m:r>
+                          <m:r>
+                            <a:rPr lang="nl-NL" sz="2000" b="0" i="1" smtClean="0">
+                              <a:latin typeface="Cambria Math" panose="02040503050406030204" pitchFamily="18" charset="0"/>
+                            </a:rPr>
+                            <m:t>4</m:t>
                           </m:r>
                         </m:e>
                       </m:d>
@@ -18913,7 +18708,25 @@
                         <a:rPr lang="en-US" sz="2000" b="0" i="1" smtClean="0">
                           <a:latin typeface="Cambria Math" panose="02040503050406030204" pitchFamily="18" charset="0"/>
                         </a:rPr>
-                        <m:t>2,5706</m:t>
+                        <m:t>2,</m:t>
+                      </m:r>
+                      <m:r>
+                        <a:rPr lang="nl-NL" sz="2000" b="0" i="1" smtClean="0">
+                          <a:latin typeface="Cambria Math" panose="02040503050406030204" pitchFamily="18" charset="0"/>
+                        </a:rPr>
+                        <m:t>7</m:t>
+                      </m:r>
+                      <m:r>
+                        <a:rPr lang="en-US" sz="2000" b="0" i="1" smtClean="0">
+                          <a:latin typeface="Cambria Math" panose="02040503050406030204" pitchFamily="18" charset="0"/>
+                        </a:rPr>
+                        <m:t>7</m:t>
+                      </m:r>
+                      <m:r>
+                        <a:rPr lang="nl-NL" sz="2000" b="0" i="1" smtClean="0">
+                          <a:latin typeface="Cambria Math" panose="02040503050406030204" pitchFamily="18" charset="0"/>
+                        </a:rPr>
+                        <m:t>64</m:t>
                       </m:r>
                     </m:oMath>
                   </m:oMathPara>
@@ -19198,7 +19011,19 @@
                             <a:rPr lang="en-US" sz="2000" i="1">
                               <a:latin typeface="Cambria Math" panose="02040503050406030204" pitchFamily="18" charset="0"/>
                             </a:rPr>
-                            <m:t>−2,5706∗</m:t>
+                            <m:t>−2,</m:t>
+                          </m:r>
+                          <m:r>
+                            <a:rPr lang="nl-NL" sz="2000" b="0" i="1" smtClean="0">
+                              <a:latin typeface="Cambria Math" panose="02040503050406030204" pitchFamily="18" charset="0"/>
+                            </a:rPr>
+                            <m:t>7764</m:t>
+                          </m:r>
+                          <m:r>
+                            <a:rPr lang="en-US" sz="2000" i="1">
+                              <a:latin typeface="Cambria Math" panose="02040503050406030204" pitchFamily="18" charset="0"/>
+                            </a:rPr>
+                            <m:t>∗</m:t>
                           </m:r>
                           <m:f>
                             <m:fPr>
@@ -19251,10 +19076,16 @@
                             <m:t>24+</m:t>
                           </m:r>
                           <m:r>
+                            <a:rPr lang="nl-NL" sz="2000" b="0" i="1" smtClean="0">
+                              <a:latin typeface="Cambria Math" panose="02040503050406030204" pitchFamily="18" charset="0"/>
+                            </a:rPr>
+                            <m:t>2,7764</m:t>
+                          </m:r>
+                          <m:r>
                             <a:rPr lang="en-US" sz="2000" i="1">
                               <a:latin typeface="Cambria Math" panose="02040503050406030204" pitchFamily="18" charset="0"/>
                             </a:rPr>
-                            <m:t>2,5706∗</m:t>
+                            <m:t>∗</m:t>
                           </m:r>
                           <m:f>
                             <m:fPr>
@@ -19317,19 +19148,37 @@
                             <a:rPr lang="en-US" sz="2000" b="0" i="1" smtClean="0">
                               <a:latin typeface="Cambria Math" panose="02040503050406030204" pitchFamily="18" charset="0"/>
                             </a:rPr>
-                            <m:t>21</m:t>
+                            <m:t>21,</m:t>
+                          </m:r>
+                          <m:r>
+                            <a:rPr lang="nl-NL" sz="2000" b="0" i="1" smtClean="0">
+                              <a:latin typeface="Cambria Math" panose="02040503050406030204" pitchFamily="18" charset="0"/>
+                            </a:rPr>
+                            <m:t>2</m:t>
                           </m:r>
                           <m:r>
                             <a:rPr lang="en-US" sz="2000" b="0" i="1" smtClean="0">
                               <a:latin typeface="Cambria Math" panose="02040503050406030204" pitchFamily="18" charset="0"/>
                             </a:rPr>
-                            <m:t>,4294</m:t>
+                            <m:t>2</m:t>
+                          </m:r>
+                          <m:r>
+                            <a:rPr lang="nl-NL" sz="2000" b="0" i="1" smtClean="0">
+                              <a:latin typeface="Cambria Math" panose="02040503050406030204" pitchFamily="18" charset="0"/>
+                            </a:rPr>
+                            <m:t>36</m:t>
                           </m:r>
                           <m:r>
                             <a:rPr lang="en-US" sz="2000" b="0" i="1" smtClean="0">
                               <a:latin typeface="Cambria Math" panose="02040503050406030204" pitchFamily="18" charset="0"/>
                             </a:rPr>
-                            <m:t>;26,5706</m:t>
+                            <m:t>;26,</m:t>
+                          </m:r>
+                          <m:r>
+                            <a:rPr lang="nl-NL" sz="2000" b="0" i="1" smtClean="0">
+                              <a:latin typeface="Cambria Math" panose="02040503050406030204" pitchFamily="18" charset="0"/>
+                            </a:rPr>
+                            <m:t>7764</m:t>
                           </m:r>
                         </m:e>
                       </m:d>
@@ -19521,7 +19370,7 @@
               <a:blipFill>
                 <a:blip r:embed="rId2"/>
                 <a:stretch>
-                  <a:fillRect l="-1426" t="-1865" r="-1027" b="-3443"/>
+                  <a:fillRect l="-1426" t="-1865" r="-1027" b="-2869"/>
                 </a:stretch>
               </a:blipFill>
             </p:spPr>
@@ -19530,7 +19379,7 @@
               <a:lstStyle/>
               <a:p>
                 <a:r>
-                  <a:rPr lang="nl-NL">
+                  <a:rPr lang="en-US">
                     <a:noFill/>
                   </a:rPr>
                   <a:t> </a:t>
@@ -20301,7 +20150,7 @@
                 <a:tabLst/>
                 <a:defRPr/>
               </a:pPr>
-              <a:t>5 juni 2025</a:t>
+              <a:t>16 juni 2025</a:t>
             </a:fld>
             <a:endParaRPr kumimoji="0" lang="nl-NL" sz="1100" b="0" i="0" u="none" strike="noStrike" kern="1200" cap="none" spc="0" normalizeH="0" baseline="0" noProof="0" smtClean="0">
               <a:ln>
@@ -24708,7 +24557,7 @@
                 <a:tabLst/>
                 <a:defRPr/>
               </a:pPr>
-              <a:t>5 juni 2025</a:t>
+              <a:t>16 juni 2025</a:t>
             </a:fld>
             <a:endParaRPr kumimoji="0" lang="nl-NL" sz="1100" b="0" i="0" u="none" strike="noStrike" kern="1200" cap="none" spc="0" normalizeH="0" baseline="0" noProof="0" smtClean="0">
               <a:ln>
@@ -29343,8 +29192,8 @@
           </p:sp>
         </mc:Fallback>
       </mc:AlternateContent>
-      <mc:AlternateContent xmlns:mc="http://schemas.openxmlformats.org/markup-compatibility/2006">
-        <mc:Choice xmlns:a14="http://schemas.microsoft.com/office/drawing/2010/main" Requires="a14">
+      <mc:AlternateContent xmlns:mc="http://schemas.openxmlformats.org/markup-compatibility/2006" xmlns:a14="http://schemas.microsoft.com/office/drawing/2010/main">
+        <mc:Choice Requires="a14">
           <p:sp>
             <p:nvSpPr>
               <p:cNvPr id="3" name="Content Placeholder 2"/>
@@ -29577,7 +29426,7 @@
             </p:txBody>
           </p:sp>
         </mc:Choice>
-        <mc:Fallback>
+        <mc:Fallback xmlns="">
           <p:sp>
             <p:nvSpPr>
               <p:cNvPr id="3" name="Content Placeholder 2"/>
@@ -29690,7 +29539,7 @@
                 <a:tabLst/>
                 <a:defRPr/>
               </a:pPr>
-              <a:t>5 juni 2025</a:t>
+              <a:t>16 juni 2025</a:t>
             </a:fld>
             <a:endParaRPr kumimoji="0" lang="nl-NL" sz="1100" b="0" i="0" u="none" strike="noStrike" kern="1200" cap="none" spc="0" normalizeH="0" baseline="0" noProof="0" smtClean="0">
               <a:ln>
@@ -30305,7 +30154,7 @@
                 <a:tabLst/>
                 <a:defRPr/>
               </a:pPr>
-              <a:t>5 juni 2025</a:t>
+              <a:t>16 juni 2025</a:t>
             </a:fld>
             <a:endParaRPr kumimoji="0" lang="nl-NL" sz="1100" b="0" i="0" u="none" strike="noStrike" kern="1200" cap="none" spc="0" normalizeH="0" baseline="0" noProof="0" smtClean="0">
               <a:ln>
@@ -30856,31 +30705,18 @@
                       </a:rPr>
                       <m:t>=</m:t>
                     </m:r>
-                    <m:f>
-                      <m:fPr>
-                        <m:ctrlPr>
-                          <a:rPr lang="en-US" sz="2400" b="0" i="1" smtClean="0">
-                            <a:latin typeface="Cambria Math" panose="02040503050406030204" pitchFamily="18" charset="0"/>
-                          </a:rPr>
-                        </m:ctrlPr>
-                      </m:fPr>
-                      <m:num>
-                        <m:r>
-                          <a:rPr lang="en-US" sz="2400" b="0" i="1" smtClean="0">
-                            <a:latin typeface="Cambria Math" panose="02040503050406030204" pitchFamily="18" charset="0"/>
-                          </a:rPr>
-                          <m:t>𝛼</m:t>
-                        </m:r>
-                      </m:num>
-                      <m:den>
-                        <m:r>
-                          <a:rPr lang="en-US" sz="2400" b="0" i="1" smtClean="0">
-                            <a:latin typeface="Cambria Math" panose="02040503050406030204" pitchFamily="18" charset="0"/>
-                          </a:rPr>
-                          <m:t>2</m:t>
-                        </m:r>
-                      </m:den>
-                    </m:f>
+                    <m:r>
+                      <a:rPr lang="nl-NL" sz="2400" b="0" i="1" smtClean="0">
+                        <a:latin typeface="Cambria Math" panose="02040503050406030204" pitchFamily="18" charset="0"/>
+                      </a:rPr>
+                      <m:t>𝛼</m:t>
+                    </m:r>
+                    <m:r>
+                      <a:rPr lang="nl-NL" sz="2400" b="0" i="1" smtClean="0">
+                        <a:latin typeface="Cambria Math" panose="02040503050406030204" pitchFamily="18" charset="0"/>
+                      </a:rPr>
+                      <m:t>/2</m:t>
+                    </m:r>
                   </m:oMath>
                 </a14:m>
                 <a:endParaRPr lang="en-US" sz="2400" b="0" dirty="0" smtClean="0"/>
@@ -31123,7 +30959,15 @@
                 </a:pPr>
                 <a:r>
                   <a:rPr lang="en-US" sz="2400" b="0" dirty="0" smtClean="0"/>
-                  <a:t>De GR </a:t>
+                  <a:t>De </a:t>
+                </a:r>
+                <a:r>
+                  <a:rPr lang="en-US" sz="2400" dirty="0" smtClean="0"/>
+                  <a:t>GR solver</a:t>
+                </a:r>
+                <a:r>
+                  <a:rPr lang="en-US" sz="2400" b="0" dirty="0" smtClean="0"/>
+                  <a:t> </a:t>
                 </a:r>
                 <a:r>
                   <a:rPr lang="en-US" sz="2400" b="0" dirty="0" err="1" smtClean="0"/>
@@ -31131,7 +30975,7 @@
                 </a:r>
                 <a:r>
                   <a:rPr lang="en-US" sz="2400" b="0" dirty="0" smtClean="0"/>
-                  <a:t> “intersect” </a:t>
+                  <a:t> </a:t>
                 </a:r>
                 <a:r>
                   <a:rPr lang="en-US" sz="2400" b="0" dirty="0" err="1" smtClean="0"/>
@@ -31215,7 +31059,7 @@
               <a:blipFill>
                 <a:blip r:embed="rId4"/>
                 <a:stretch>
-                  <a:fillRect l="-1490" b="-5165"/>
+                  <a:fillRect l="-1490" b="-2152"/>
                 </a:stretch>
               </a:blipFill>
             </p:spPr>
@@ -31224,7 +31068,7 @@
               <a:lstStyle/>
               <a:p>
                 <a:r>
-                  <a:rPr lang="nl-NL">
+                  <a:rPr lang="en-US">
                     <a:noFill/>
                   </a:rPr>
                   <a:t> </a:t>
@@ -31309,7 +31153,7 @@
                 <a:tabLst/>
                 <a:defRPr/>
               </a:pPr>
-              <a:t>5 juni 2025</a:t>
+              <a:t>16 juni 2025</a:t>
             </a:fld>
             <a:endParaRPr kumimoji="0" lang="nl-NL" sz="1100" b="0" i="0" u="none" strike="noStrike" kern="1200" cap="none" spc="0" normalizeH="0" baseline="0" noProof="0" smtClean="0">
               <a:ln>
@@ -32235,12 +32079,16 @@
                   <a:t>GR </a:t>
                 </a:r>
                 <a:r>
-                  <a:rPr lang="en-US" dirty="0" err="1"/>
+                  <a:rPr lang="en-US" dirty="0" smtClean="0"/>
+                  <a:t>solver </a:t>
+                </a:r>
+                <a:r>
+                  <a:rPr lang="en-US" dirty="0" err="1" smtClean="0"/>
                   <a:t>optie</a:t>
                 </a:r>
                 <a:r>
-                  <a:rPr lang="en-US" dirty="0"/>
-                  <a:t> “intersect” </a:t>
+                  <a:rPr lang="en-US" dirty="0" smtClean="0"/>
+                  <a:t> </a:t>
                 </a:r>
                 <a:r>
                   <a:rPr lang="en-US" dirty="0" err="1"/>
@@ -32333,7 +32181,7 @@
               <a:lstStyle/>
               <a:p>
                 <a:r>
-                  <a:rPr lang="nl-NL">
+                  <a:rPr lang="en-US">
                     <a:noFill/>
                   </a:rPr>
                   <a:t> </a:t>
@@ -32418,7 +32266,7 @@
                 <a:tabLst/>
                 <a:defRPr/>
               </a:pPr>
-              <a:t>5 juni 2025</a:t>
+              <a:t>16 juni 2025</a:t>
             </a:fld>
             <a:endParaRPr kumimoji="0" lang="nl-NL" sz="1100" b="0" i="0" u="none" strike="noStrike" kern="1200" cap="none" spc="0" normalizeH="0" baseline="0" noProof="0" smtClean="0">
               <a:ln>
@@ -32663,8 +32511,8 @@
           </p:sp>
         </mc:Fallback>
       </mc:AlternateContent>
-      <mc:AlternateContent xmlns:mc="http://schemas.openxmlformats.org/markup-compatibility/2006">
-        <mc:Choice xmlns:a14="http://schemas.microsoft.com/office/drawing/2010/main" Requires="a14">
+      <mc:AlternateContent xmlns:mc="http://schemas.openxmlformats.org/markup-compatibility/2006" xmlns:a14="http://schemas.microsoft.com/office/drawing/2010/main">
+        <mc:Choice Requires="a14">
           <p:sp>
             <p:nvSpPr>
               <p:cNvPr id="3" name="Content Placeholder 2"/>
@@ -32874,7 +32722,6 @@
                   <a:rPr lang="en-US" dirty="0" smtClean="0"/>
                   <a:t>.</a:t>
                 </a:r>
-                <a:endParaRPr lang="en-US" dirty="0" smtClean="0"/>
               </a:p>
               <a:p>
                 <a:endParaRPr lang="en-US" dirty="0"/>
@@ -32968,7 +32815,7 @@
             </p:txBody>
           </p:sp>
         </mc:Choice>
-        <mc:Fallback>
+        <mc:Fallback xmlns="">
           <p:sp>
             <p:nvSpPr>
               <p:cNvPr id="3" name="Content Placeholder 2"/>
@@ -33081,7 +32928,7 @@
                 <a:tabLst/>
                 <a:defRPr/>
               </a:pPr>
-              <a:t>5 juni 2025</a:t>
+              <a:t>16 juni 2025</a:t>
             </a:fld>
             <a:endParaRPr kumimoji="0" lang="nl-NL" sz="1100" b="0" i="0" u="none" strike="noStrike" kern="1200" cap="none" spc="0" normalizeH="0" baseline="0" noProof="0" smtClean="0">
               <a:ln>
@@ -33237,8 +33084,8 @@
           </a:p>
         </p:txBody>
       </p:sp>
-      <mc:AlternateContent xmlns:mc="http://schemas.openxmlformats.org/markup-compatibility/2006">
-        <mc:Choice xmlns:a14="http://schemas.microsoft.com/office/drawing/2010/main" Requires="a14">
+      <mc:AlternateContent xmlns:mc="http://schemas.openxmlformats.org/markup-compatibility/2006" xmlns:a14="http://schemas.microsoft.com/office/drawing/2010/main">
+        <mc:Choice Requires="a14">
           <p:sp>
             <p:nvSpPr>
               <p:cNvPr id="3" name="Content Placeholder 2"/>
@@ -33977,7 +33824,7 @@
             </p:txBody>
           </p:sp>
         </mc:Choice>
-        <mc:Fallback>
+        <mc:Fallback xmlns="">
           <p:sp>
             <p:nvSpPr>
               <p:cNvPr id="3" name="Content Placeholder 2"/>
@@ -34149,8 +33996,8 @@
           </a:p>
         </p:txBody>
       </p:sp>
-      <mc:AlternateContent xmlns:mc="http://schemas.openxmlformats.org/markup-compatibility/2006" xmlns:a14="http://schemas.microsoft.com/office/drawing/2010/main">
-        <mc:Choice Requires="a14">
+      <mc:AlternateContent xmlns:mc="http://schemas.openxmlformats.org/markup-compatibility/2006">
+        <mc:Choice xmlns:a14="http://schemas.microsoft.com/office/drawing/2010/main" Requires="a14">
           <p:sp>
             <p:nvSpPr>
               <p:cNvPr id="3" name="Content Placeholder 2"/>
@@ -34406,7 +34253,23 @@
                 </a14:m>
                 <a:r>
                   <a:rPr lang="en-US" sz="2000" dirty="0" smtClean="0"/>
-                  <a:t> (want 95%).</a:t>
+                  <a:t> (want </a:t>
+                </a:r>
+                <a:r>
+                  <a:rPr lang="en-US" sz="2000" dirty="0" smtClean="0"/>
+                  <a:t>het </a:t>
+                </a:r>
+                <a:r>
+                  <a:rPr lang="en-US" sz="2000" dirty="0" err="1" smtClean="0"/>
+                  <a:t>betrouwbaarheidsniveau</a:t>
+                </a:r>
+                <a:r>
+                  <a:rPr lang="en-US" sz="2000" dirty="0" smtClean="0"/>
+                  <a:t> is 95</a:t>
+                </a:r>
+                <a:r>
+                  <a:rPr lang="en-US" sz="2000" dirty="0" smtClean="0"/>
+                  <a:t>%).</a:t>
                 </a:r>
               </a:p>
               <a:p>
@@ -34415,7 +34278,7 @@
               <a:p>
                 <a:r>
                   <a:rPr lang="en-US" sz="2000" dirty="0" err="1" smtClean="0"/>
-                  <a:t>Omdat</a:t>
+                  <a:t>Hoewel</a:t>
                 </a:r>
                 <a:r>
                   <a:rPr lang="en-US" sz="2000" dirty="0" smtClean="0"/>
@@ -34445,71 +34308,71 @@
                 </a:r>
                 <a:r>
                   <a:rPr lang="en-US" sz="2000" dirty="0" err="1" smtClean="0"/>
-                  <a:t>gebruiken</a:t>
+                  <a:t>kunnen</a:t>
                 </a:r>
                 <a:r>
                   <a:rPr lang="en-US" sz="2000" dirty="0" smtClean="0"/>
                   <a:t> we de </a:t>
+                </a:r>
+                <a:r>
+                  <a:rPr lang="en-US" sz="2000" dirty="0" err="1" smtClean="0"/>
+                  <a:t>normale</a:t>
+                </a:r>
+                <a:r>
+                  <a:rPr lang="en-US" sz="2000" dirty="0" smtClean="0"/>
+                  <a:t> </a:t>
+                </a:r>
+                <a:r>
+                  <a:rPr lang="en-US" sz="2000" dirty="0" err="1" smtClean="0"/>
+                  <a:t>verdeling</a:t>
+                </a:r>
+                <a:r>
+                  <a:rPr lang="en-US" sz="2000" dirty="0" smtClean="0"/>
+                  <a:t> </a:t>
+                </a:r>
+                <a:r>
+                  <a:rPr lang="en-US" sz="2000" dirty="0" err="1" smtClean="0"/>
+                  <a:t>gebruiken</a:t>
+                </a:r>
+                <a:r>
+                  <a:rPr lang="en-US" sz="2000" dirty="0" smtClean="0"/>
+                  <a:t> </a:t>
+                </a:r>
+                <a:r>
+                  <a:rPr lang="en-US" sz="2000" dirty="0" err="1" smtClean="0"/>
+                  <a:t>omdat</a:t>
+                </a:r>
+                <a:r>
+                  <a:rPr lang="en-US" sz="2000" dirty="0" smtClean="0"/>
+                  <a:t> de </a:t>
+                </a:r>
+                <a:r>
+                  <a:rPr lang="en-US" sz="2000" dirty="0" err="1" smtClean="0"/>
+                  <a:t>steekproefomvang</a:t>
+                </a:r>
+                <a:r>
+                  <a:rPr lang="en-US" sz="2000" dirty="0" smtClean="0"/>
+                  <a:t> </a:t>
                 </a:r>
                 <a14:m>
                   <m:oMath xmlns:m="http://schemas.openxmlformats.org/officeDocument/2006/math">
                     <m:r>
-                      <a:rPr lang="en-US" sz="2000" b="0" i="1" smtClean="0">
-                        <a:latin typeface="Cambria Math" panose="02040503050406030204" pitchFamily="18" charset="0"/>
-                      </a:rPr>
-                      <m:t>𝑡</m:t>
-                    </m:r>
-                  </m:oMath>
-                </a14:m>
-                <a:r>
-                  <a:rPr lang="en-US" sz="2000" dirty="0" smtClean="0"/>
-                  <a:t>-</a:t>
-                </a:r>
-                <a:r>
-                  <a:rPr lang="en-US" sz="2000" dirty="0" err="1" smtClean="0"/>
-                  <a:t>verdeling</a:t>
-                </a:r>
-                <a:r>
-                  <a:rPr lang="en-US" sz="2000" dirty="0" smtClean="0"/>
-                  <a:t> (met </a:t>
-                </a:r>
-                <a14:m>
-                  <m:oMath xmlns:m="http://schemas.openxmlformats.org/officeDocument/2006/math">
-                    <m:r>
-                      <a:rPr lang="en-US" sz="2000" b="0" i="1" smtClean="0">
+                      <a:rPr lang="nl-NL" sz="2000" b="0" i="1" smtClean="0">
                         <a:latin typeface="Cambria Math" panose="02040503050406030204" pitchFamily="18" charset="0"/>
                       </a:rPr>
                       <m:t>𝑛</m:t>
                     </m:r>
                     <m:r>
-                      <a:rPr lang="en-US" sz="2000" b="0" i="1" smtClean="0">
+                      <a:rPr lang="nl-NL" sz="2000" b="0" i="1" smtClean="0">
                         <a:latin typeface="Cambria Math" panose="02040503050406030204" pitchFamily="18" charset="0"/>
                       </a:rPr>
-                      <m:t>−1=149</m:t>
+                      <m:t>=150&gt;30</m:t>
                     </m:r>
                   </m:oMath>
                 </a14:m>
                 <a:r>
                   <a:rPr lang="en-US" sz="2000" dirty="0" smtClean="0"/>
-                  <a:t> </a:t>
-                </a:r>
-                <a:r>
-                  <a:rPr lang="en-US" sz="2000" dirty="0" err="1" smtClean="0"/>
-                  <a:t>vrijheidsgraden</a:t>
-                </a:r>
-                <a:r>
-                  <a:rPr lang="en-US" sz="2000" dirty="0" smtClean="0"/>
-                  <a:t>).</a:t>
-                </a:r>
-              </a:p>
-              <a:p>
-                <a:r>
-                  <a:rPr lang="en-US" sz="2000" dirty="0" err="1" smtClean="0"/>
-                  <a:t>Omdat</a:t>
-                </a:r>
-                <a:r>
-                  <a:rPr lang="en-US" sz="2000" dirty="0" smtClean="0"/>
-                  <a:t> </a:t>
+                  <a:t>. Omdat </a:t>
                 </a:r>
                 <a14:m>
                   <m:oMath xmlns:m="http://schemas.openxmlformats.org/officeDocument/2006/math">
@@ -34553,47 +34416,39 @@
                 </a:r>
                 <a:r>
                   <a:rPr lang="en-US" sz="2000" dirty="0" smtClean="0"/>
-                  <a:t> met </a:t>
+                  <a:t> </a:t>
+                </a:r>
+                <a:r>
+                  <a:rPr lang="en-US" sz="2000" dirty="0" smtClean="0"/>
+                  <a:t>met  </a:t>
                 </a:r>
                 <a14:m>
                   <m:oMath xmlns:m="http://schemas.openxmlformats.org/officeDocument/2006/math">
-                    <m:r>
-                      <a:rPr lang="en-US" sz="2000" b="0" i="1" smtClean="0">
-                        <a:latin typeface="Cambria Math" panose="02040503050406030204" pitchFamily="18" charset="0"/>
-                      </a:rPr>
-                      <m:t>𝑡</m:t>
-                    </m:r>
-                    <m:r>
-                      <a:rPr lang="en-US" sz="2000" b="0" i="1" smtClean="0">
-                        <a:latin typeface="Cambria Math" panose="02040503050406030204" pitchFamily="18" charset="0"/>
-                      </a:rPr>
-                      <m:t>=</m:t>
-                    </m:r>
                     <m:sSub>
                       <m:sSubPr>
                         <m:ctrlPr>
-                          <a:rPr lang="en-US" sz="2000" b="0" i="1" smtClean="0">
+                          <a:rPr lang="nl-NL" sz="2000" b="0" i="1" smtClean="0">
                             <a:latin typeface="Cambria Math" panose="02040503050406030204" pitchFamily="18" charset="0"/>
                           </a:rPr>
                         </m:ctrlPr>
                       </m:sSubPr>
                       <m:e>
                         <m:r>
-                          <a:rPr lang="en-US" sz="2000" b="0" i="1" smtClean="0">
+                          <a:rPr lang="nl-NL" sz="2000" b="0" i="1" smtClean="0">
                             <a:latin typeface="Cambria Math" panose="02040503050406030204" pitchFamily="18" charset="0"/>
                           </a:rPr>
-                          <m:t>𝑡</m:t>
+                          <m:t>𝑧</m:t>
                         </m:r>
                       </m:e>
                       <m:sub>
                         <m:r>
-                          <a:rPr lang="en-US" sz="2000" b="0" i="1" smtClean="0">
+                          <a:rPr lang="nl-NL" sz="2000" b="0" i="1" smtClean="0">
                             <a:latin typeface="Cambria Math" panose="02040503050406030204" pitchFamily="18" charset="0"/>
                           </a:rPr>
                           <m:t>𝛼</m:t>
                         </m:r>
                         <m:r>
-                          <a:rPr lang="en-US" sz="2000" b="0" i="1" smtClean="0">
+                          <a:rPr lang="nl-NL" sz="2000" b="0" i="1" smtClean="0">
                             <a:latin typeface="Cambria Math" panose="02040503050406030204" pitchFamily="18" charset="0"/>
                           </a:rPr>
                           <m:t>/2</m:t>
@@ -34604,62 +34459,103 @@
                       <a:rPr lang="en-US" sz="2000" b="0" i="1" smtClean="0">
                         <a:latin typeface="Cambria Math" panose="02040503050406030204" pitchFamily="18" charset="0"/>
                       </a:rPr>
-                      <m:t>(</m:t>
+                      <m:t>=</m:t>
                     </m:r>
                     <m:r>
-                      <a:rPr lang="en-US" sz="2000" b="0" i="1" smtClean="0">
+                      <m:rPr>
+                        <m:sty m:val="p"/>
+                      </m:rPr>
+                      <a:rPr lang="nl-NL" sz="2000" b="0" i="0" smtClean="0">
                         <a:latin typeface="Cambria Math" panose="02040503050406030204" pitchFamily="18" charset="0"/>
                       </a:rPr>
-                      <m:t>𝑛</m:t>
+                      <m:t>InvNorm</m:t>
                     </m:r>
-                    <m:r>
-                      <a:rPr lang="en-US" sz="2000" b="0" i="1" smtClean="0">
-                        <a:latin typeface="Cambria Math" panose="02040503050406030204" pitchFamily="18" charset="0"/>
-                      </a:rPr>
-                      <m:t>−1)=</m:t>
-                    </m:r>
-                    <m:sSub>
-                      <m:sSubPr>
+                    <m:d>
+                      <m:dPr>
                         <m:ctrlPr>
-                          <a:rPr lang="en-US" sz="2000" b="0" i="1" smtClean="0">
+                          <a:rPr lang="nl-NL" sz="2000" b="0" i="1" smtClean="0">
                             <a:latin typeface="Cambria Math" panose="02040503050406030204" pitchFamily="18" charset="0"/>
                           </a:rPr>
                         </m:ctrlPr>
-                      </m:sSubPr>
+                      </m:dPr>
                       <m:e>
                         <m:r>
-                          <a:rPr lang="en-US" sz="2000" b="0" i="1" smtClean="0">
+                          <m:rPr>
+                            <m:sty m:val="p"/>
+                          </m:rPr>
+                          <a:rPr lang="nl-NL" sz="2000" b="0" i="0" smtClean="0">
                             <a:latin typeface="Cambria Math" panose="02040503050406030204" pitchFamily="18" charset="0"/>
                           </a:rPr>
-                          <m:t>𝑡</m:t>
+                          <m:t>opp</m:t>
+                        </m:r>
+                        <m:r>
+                          <a:rPr lang="nl-NL" sz="2000" b="0" i="1" smtClean="0">
+                            <a:latin typeface="Cambria Math" panose="02040503050406030204" pitchFamily="18" charset="0"/>
+                          </a:rPr>
+                          <m:t>=1−</m:t>
+                        </m:r>
+                        <m:f>
+                          <m:fPr>
+                            <m:ctrlPr>
+                              <a:rPr lang="nl-NL" sz="2000" b="0" i="1" smtClean="0">
+                                <a:latin typeface="Cambria Math" panose="02040503050406030204" pitchFamily="18" charset="0"/>
+                              </a:rPr>
+                            </m:ctrlPr>
+                          </m:fPr>
+                          <m:num>
+                            <m:r>
+                              <a:rPr lang="nl-NL" sz="2000" b="0" i="1" smtClean="0">
+                                <a:latin typeface="Cambria Math" panose="02040503050406030204" pitchFamily="18" charset="0"/>
+                              </a:rPr>
+                              <m:t>𝛼</m:t>
+                            </m:r>
+                          </m:num>
+                          <m:den>
+                            <m:r>
+                              <a:rPr lang="nl-NL" sz="2000" b="0" i="1" smtClean="0">
+                                <a:latin typeface="Cambria Math" panose="02040503050406030204" pitchFamily="18" charset="0"/>
+                              </a:rPr>
+                              <m:t>2</m:t>
+                            </m:r>
+                          </m:den>
+                        </m:f>
+                        <m:r>
+                          <a:rPr lang="nl-NL" sz="2000" b="0" i="1" smtClean="0">
+                            <a:latin typeface="Cambria Math" panose="02040503050406030204" pitchFamily="18" charset="0"/>
+                          </a:rPr>
+                          <m:t>;</m:t>
+                        </m:r>
+                        <m:r>
+                          <a:rPr lang="nl-NL" sz="2000" b="0" i="1" smtClean="0">
+                            <a:latin typeface="Cambria Math" panose="02040503050406030204" pitchFamily="18" charset="0"/>
+                          </a:rPr>
+                          <m:t>𝜇</m:t>
+                        </m:r>
+                        <m:r>
+                          <a:rPr lang="nl-NL" sz="2000" b="0" i="1" smtClean="0">
+                            <a:latin typeface="Cambria Math" panose="02040503050406030204" pitchFamily="18" charset="0"/>
+                          </a:rPr>
+                          <m:t>=0;</m:t>
+                        </m:r>
+                        <m:r>
+                          <a:rPr lang="nl-NL" sz="2000" b="0" i="1" smtClean="0">
+                            <a:latin typeface="Cambria Math" panose="02040503050406030204" pitchFamily="18" charset="0"/>
+                          </a:rPr>
+                          <m:t>𝜎</m:t>
+                        </m:r>
+                        <m:r>
+                          <a:rPr lang="nl-NL" sz="2000" b="0" i="1" smtClean="0">
+                            <a:latin typeface="Cambria Math" panose="02040503050406030204" pitchFamily="18" charset="0"/>
+                          </a:rPr>
+                          <m:t>=1</m:t>
                         </m:r>
                       </m:e>
-                      <m:sub>
-                        <m:r>
-                          <a:rPr lang="en-US" sz="2000" b="0" i="1" smtClean="0">
-                            <a:latin typeface="Cambria Math" panose="02040503050406030204" pitchFamily="18" charset="0"/>
-                          </a:rPr>
-                          <m:t>0,025</m:t>
-                        </m:r>
-                      </m:sub>
-                    </m:sSub>
+                    </m:d>
                     <m:r>
-                      <a:rPr lang="en-US" sz="2000" b="0" i="1" smtClean="0">
+                      <a:rPr lang="nl-NL" sz="2000" b="0" i="1" smtClean="0">
                         <a:latin typeface="Cambria Math" panose="02040503050406030204" pitchFamily="18" charset="0"/>
                       </a:rPr>
-                      <m:t>(</m:t>
-                    </m:r>
-                    <m:r>
-                      <a:rPr lang="en-US" sz="2000" b="0" i="1" smtClean="0">
-                        <a:latin typeface="Cambria Math" panose="02040503050406030204" pitchFamily="18" charset="0"/>
-                      </a:rPr>
-                      <m:t>𝑛</m:t>
-                    </m:r>
-                    <m:r>
-                      <a:rPr lang="en-US" sz="2000" b="0" i="1" smtClean="0">
-                        <a:latin typeface="Cambria Math" panose="02040503050406030204" pitchFamily="18" charset="0"/>
-                      </a:rPr>
-                      <m:t>−1)≈1,9760</m:t>
+                      <m:t>≈1,9600</m:t>
                     </m:r>
                   </m:oMath>
                 </a14:m>
@@ -34677,12 +34573,87 @@
                 </a:r>
                 <a:r>
                   <a:rPr lang="en-US" sz="2000" dirty="0" err="1" smtClean="0"/>
+                  <a:t>kunnen</a:t>
+                </a:r>
+                <a:r>
+                  <a:rPr lang="en-US" sz="2000" dirty="0" smtClean="0"/>
+                  <a:t> we de </a:t>
+                </a:r>
+                <a:r>
+                  <a:rPr lang="en-US" sz="2000" dirty="0" err="1" smtClean="0"/>
+                  <a:t>standaardafwijking</a:t>
+                </a:r>
+                <a:r>
+                  <a:rPr lang="en-US" sz="2000" dirty="0" smtClean="0"/>
+                  <a:t> </a:t>
+                </a:r>
+                <a14:m>
+                  <m:oMath xmlns:m="http://schemas.openxmlformats.org/officeDocument/2006/math">
+                    <m:r>
+                      <a:rPr lang="nl-NL" sz="2000" b="0" i="1" smtClean="0">
+                        <a:latin typeface="Cambria Math" panose="02040503050406030204" pitchFamily="18" charset="0"/>
+                      </a:rPr>
+                      <m:t>𝜎</m:t>
+                    </m:r>
+                  </m:oMath>
+                </a14:m>
+                <a:r>
+                  <a:rPr lang="en-US" sz="2000" dirty="0" smtClean="0"/>
+                  <a:t> </a:t>
+                </a:r>
+                <a:r>
+                  <a:rPr lang="en-US" sz="2000" dirty="0" err="1" smtClean="0"/>
+                  <a:t>benaderen</a:t>
+                </a:r>
+                <a:r>
+                  <a:rPr lang="en-US" sz="2000" dirty="0" smtClean="0"/>
+                  <a:t> met </a:t>
+                </a:r>
+                <a14:m>
+                  <m:oMath xmlns:m="http://schemas.openxmlformats.org/officeDocument/2006/math">
+                    <m:r>
+                      <a:rPr lang="nl-NL" sz="2000" b="0" i="1" smtClean="0">
+                        <a:latin typeface="Cambria Math" panose="02040503050406030204" pitchFamily="18" charset="0"/>
+                      </a:rPr>
+                      <m:t>𝑠</m:t>
+                    </m:r>
+                    <m:r>
+                      <a:rPr lang="nl-NL" sz="2000" b="0" i="1" smtClean="0">
+                        <a:latin typeface="Cambria Math" panose="02040503050406030204" pitchFamily="18" charset="0"/>
+                      </a:rPr>
+                      <m:t>=12,0</m:t>
+                    </m:r>
+                  </m:oMath>
+                </a14:m>
+                <a:r>
+                  <a:rPr lang="en-US" sz="2000" dirty="0" smtClean="0"/>
+                  <a:t>. We </a:t>
+                </a:r>
+                <a:r>
+                  <a:rPr lang="en-US" sz="2000" dirty="0" err="1" smtClean="0"/>
                   <a:t>krijgen</a:t>
                 </a:r>
                 <a:r>
                   <a:rPr lang="en-US" sz="2000" dirty="0" smtClean="0"/>
-                  <a:t> we:</a:t>
-                </a:r>
+                  <a:t> in </a:t>
+                </a:r>
+                <a:r>
+                  <a:rPr lang="en-US" sz="2000" dirty="0" err="1" smtClean="0"/>
+                  <a:t>dat</a:t>
+                </a:r>
+                <a:r>
+                  <a:rPr lang="en-US" sz="2000" dirty="0" smtClean="0"/>
+                  <a:t> </a:t>
+                </a:r>
+                <a:r>
+                  <a:rPr lang="en-US" sz="2000" dirty="0" err="1" smtClean="0"/>
+                  <a:t>geval</a:t>
+                </a:r>
+                <a:r>
+                  <a:rPr lang="en-US" sz="2000" dirty="0" smtClean="0"/>
+                  <a:t>:</a:t>
+                </a:r>
+                <a:endParaRPr lang="en-US" sz="2000" dirty="0" smtClean="0"/>
               </a:p>
               <a:p>
                 <a:endParaRPr lang="en-US" sz="2000" dirty="0"/>
@@ -34731,16 +34702,16 @@
                             <m:t>−</m:t>
                           </m:r>
                           <m:r>
-                            <a:rPr lang="en-US" sz="2000" b="0" i="1" smtClean="0">
+                            <a:rPr lang="nl-NL" sz="2000" b="0" i="1" smtClean="0">
                               <a:latin typeface="Cambria Math" panose="02040503050406030204" pitchFamily="18" charset="0"/>
                             </a:rPr>
-                            <m:t>𝑡</m:t>
+                            <m:t>𝑧</m:t>
                           </m:r>
                           <m:r>
-                            <a:rPr lang="en-US" sz="2000" b="0" i="1" smtClean="0">
+                            <a:rPr lang="nl-NL" sz="2000" b="0" i="1" smtClean="0">
                               <a:latin typeface="Cambria Math" panose="02040503050406030204" pitchFamily="18" charset="0"/>
                             </a:rPr>
-                            <m:t>∗</m:t>
+                            <m:t>⋅</m:t>
                           </m:r>
                           <m:f>
                             <m:fPr>
@@ -34811,16 +34782,16 @@
                             <m:t>+</m:t>
                           </m:r>
                           <m:r>
-                            <a:rPr lang="en-US" sz="2000" b="0" i="1" smtClean="0">
+                            <a:rPr lang="nl-NL" sz="2000" b="0" i="1" smtClean="0">
                               <a:latin typeface="Cambria Math" panose="02040503050406030204" pitchFamily="18" charset="0"/>
                             </a:rPr>
-                            <m:t>𝑡</m:t>
+                            <m:t>𝑧</m:t>
                           </m:r>
                           <m:r>
-                            <a:rPr lang="en-US" sz="2000" i="1">
+                            <a:rPr lang="nl-NL" sz="2000" b="0" i="1" smtClean="0">
                               <a:latin typeface="Cambria Math" panose="02040503050406030204" pitchFamily="18" charset="0"/>
                             </a:rPr>
-                            <m:t>∗</m:t>
+                            <m:t>⋅</m:t>
                           </m:r>
                           <m:f>
                             <m:fPr>
@@ -34889,13 +34860,13 @@
                             <a:rPr lang="en-US" sz="2000" i="1">
                               <a:latin typeface="Cambria Math" panose="02040503050406030204" pitchFamily="18" charset="0"/>
                             </a:rPr>
-                            <m:t>1,976</m:t>
+                            <m:t>1,9</m:t>
                           </m:r>
                           <m:r>
-                            <a:rPr lang="en-US" sz="2000" b="0" i="1" smtClean="0">
+                            <a:rPr lang="nl-NL" sz="2000" b="0" i="1" smtClean="0">
                               <a:latin typeface="Cambria Math" panose="02040503050406030204" pitchFamily="18" charset="0"/>
                             </a:rPr>
-                            <m:t>0∗</m:t>
+                            <m:t>600⋅</m:t>
                           </m:r>
                           <m:f>
                             <m:fPr>
@@ -34957,7 +34928,13 @@
                             <a:rPr lang="en-US" sz="2000" i="1">
                               <a:latin typeface="Cambria Math" panose="02040503050406030204" pitchFamily="18" charset="0"/>
                             </a:rPr>
-                            <m:t>1,976∗</m:t>
+                            <m:t>1,96</m:t>
+                          </m:r>
+                          <m:r>
+                            <a:rPr lang="nl-NL" sz="2000" b="0" i="1" smtClean="0">
+                              <a:latin typeface="Cambria Math" panose="02040503050406030204" pitchFamily="18" charset="0"/>
+                            </a:rPr>
+                            <m:t>00⋅</m:t>
                           </m:r>
                           <m:f>
                             <m:fPr>
@@ -35030,7 +35007,31 @@
                         <a:rPr lang="en-US" sz="2000" b="0" i="1" smtClean="0">
                           <a:latin typeface="Cambria Math" panose="02040503050406030204" pitchFamily="18" charset="0"/>
                         </a:rPr>
-                        <m:t>=[32,2639;36,1361]</m:t>
+                        <m:t>=[32,2</m:t>
+                      </m:r>
+                      <m:r>
+                        <a:rPr lang="nl-NL" sz="2000" b="0" i="1" smtClean="0">
+                          <a:latin typeface="Cambria Math" panose="02040503050406030204" pitchFamily="18" charset="0"/>
+                        </a:rPr>
+                        <m:t>796</m:t>
+                      </m:r>
+                      <m:r>
+                        <a:rPr lang="en-US" sz="2000" b="0" i="1" smtClean="0">
+                          <a:latin typeface="Cambria Math" panose="02040503050406030204" pitchFamily="18" charset="0"/>
+                        </a:rPr>
+                        <m:t>;36,1</m:t>
+                      </m:r>
+                      <m:r>
+                        <a:rPr lang="nl-NL" sz="2000" b="0" i="1" smtClean="0">
+                          <a:latin typeface="Cambria Math" panose="02040503050406030204" pitchFamily="18" charset="0"/>
+                        </a:rPr>
+                        <m:t>203</m:t>
+                      </m:r>
+                      <m:r>
+                        <a:rPr lang="en-US" sz="2000" b="0" i="1" smtClean="0">
+                          <a:latin typeface="Cambria Math" panose="02040503050406030204" pitchFamily="18" charset="0"/>
+                        </a:rPr>
+                        <m:t>]</m:t>
                       </m:r>
                     </m:oMath>
                   </m:oMathPara>
@@ -35040,7 +35041,7 @@
             </p:txBody>
           </p:sp>
         </mc:Choice>
-        <mc:Fallback xmlns="">
+        <mc:Fallback>
           <p:sp>
             <p:nvSpPr>
               <p:cNvPr id="3" name="Content Placeholder 2"/>
@@ -35059,7 +35060,7 @@
               <a:blipFill>
                 <a:blip r:embed="rId2"/>
                 <a:stretch>
-                  <a:fillRect l="-1426" t="-1865" b="-574"/>
+                  <a:fillRect l="-1426" t="-1865" r="-57" b="-10330"/>
                 </a:stretch>
               </a:blipFill>
             </p:spPr>
@@ -35068,7 +35069,7 @@
               <a:lstStyle/>
               <a:p>
                 <a:r>
-                  <a:rPr lang="nl-NL">
+                  <a:rPr lang="en-US">
                     <a:noFill/>
                   </a:rPr>
                   <a:t> </a:t>
@@ -35595,10 +35596,10 @@
                           <m:t>𝑡</m:t>
                         </m:r>
                         <m:r>
-                          <a:rPr lang="en-US" sz="2000" i="1">
+                          <a:rPr lang="nl-NL" sz="2000" b="0" i="1" smtClean="0">
                             <a:latin typeface="Cambria Math" panose="02040503050406030204" pitchFamily="18" charset="0"/>
                           </a:rPr>
-                          <m:t>∗</m:t>
+                          <m:t>⋅</m:t>
                         </m:r>
                         <m:f>
                           <m:fPr>
@@ -35675,10 +35676,10 @@
                           <m:t>𝑡</m:t>
                         </m:r>
                         <m:r>
-                          <a:rPr lang="en-US" sz="2000" i="1">
+                          <a:rPr lang="nl-NL" sz="2000" b="0" i="1" smtClean="0">
                             <a:latin typeface="Cambria Math" panose="02040503050406030204" pitchFamily="18" charset="0"/>
                           </a:rPr>
-                          <m:t>∗</m:t>
+                          <m:t>⋅</m:t>
                         </m:r>
                         <m:f>
                           <m:fPr>
@@ -35761,42 +35762,49 @@
                       <m:t>𝑡</m:t>
                     </m:r>
                     <m:r>
-                      <a:rPr lang="en-US" sz="2000" b="0" i="1" smtClean="0">
+                      <a:rPr lang="nl-NL" sz="2000" b="0" i="1" smtClean="0">
                         <a:latin typeface="Cambria Math" panose="02040503050406030204" pitchFamily="18" charset="0"/>
                       </a:rPr>
-                      <m:t>∗</m:t>
+                      <m:t>⋅</m:t>
                     </m:r>
-                    <m:r>
-                      <a:rPr lang="en-US" sz="2000" b="0" i="1" smtClean="0">
-                        <a:latin typeface="Cambria Math" panose="02040503050406030204" pitchFamily="18" charset="0"/>
-                      </a:rPr>
-                      <m:t>𝑠</m:t>
-                    </m:r>
-                    <m:r>
-                      <a:rPr lang="en-US" sz="2000" b="0" i="1" smtClean="0">
-                        <a:latin typeface="Cambria Math" panose="02040503050406030204" pitchFamily="18" charset="0"/>
-                      </a:rPr>
-                      <m:t>/</m:t>
-                    </m:r>
-                    <m:rad>
-                      <m:radPr>
-                        <m:degHide m:val="on"/>
+                    <m:f>
+                      <m:fPr>
                         <m:ctrlPr>
                           <a:rPr lang="en-US" sz="2000" b="0" i="1" smtClean="0">
                             <a:latin typeface="Cambria Math" panose="02040503050406030204" pitchFamily="18" charset="0"/>
                           </a:rPr>
                         </m:ctrlPr>
-                      </m:radPr>
-                      <m:deg/>
-                      <m:e>
+                      </m:fPr>
+                      <m:num>
                         <m:r>
                           <a:rPr lang="en-US" sz="2000" b="0" i="1" smtClean="0">
                             <a:latin typeface="Cambria Math" panose="02040503050406030204" pitchFamily="18" charset="0"/>
                           </a:rPr>
-                          <m:t>𝑛</m:t>
+                          <m:t>𝑠</m:t>
                         </m:r>
-                      </m:e>
-                    </m:rad>
+                      </m:num>
+                      <m:den>
+                        <m:rad>
+                          <m:radPr>
+                            <m:degHide m:val="on"/>
+                            <m:ctrlPr>
+                              <a:rPr lang="en-US" sz="2000" b="0" i="1" smtClean="0">
+                                <a:latin typeface="Cambria Math" panose="02040503050406030204" pitchFamily="18" charset="0"/>
+                              </a:rPr>
+                            </m:ctrlPr>
+                          </m:radPr>
+                          <m:deg/>
+                          <m:e>
+                            <m:r>
+                              <a:rPr lang="en-US" sz="2000" b="0" i="1" smtClean="0">
+                                <a:latin typeface="Cambria Math" panose="02040503050406030204" pitchFamily="18" charset="0"/>
+                              </a:rPr>
+                              <m:t>𝑛</m:t>
+                            </m:r>
+                          </m:e>
+                        </m:rad>
+                      </m:den>
+                    </m:f>
                   </m:oMath>
                 </a14:m>
                 <a:r>
@@ -35825,79 +35833,6 @@
                       </a:rPr>
                       <m:t>𝑡</m:t>
                     </m:r>
-                    <m:r>
-                      <a:rPr lang="en-US" sz="2000" b="0" i="1" smtClean="0">
-                        <a:latin typeface="Cambria Math" panose="02040503050406030204" pitchFamily="18" charset="0"/>
-                      </a:rPr>
-                      <m:t>=</m:t>
-                    </m:r>
-                    <m:sSub>
-                      <m:sSubPr>
-                        <m:ctrlPr>
-                          <a:rPr lang="en-US" sz="2000" b="0" i="1" smtClean="0">
-                            <a:latin typeface="Cambria Math" panose="02040503050406030204" pitchFamily="18" charset="0"/>
-                          </a:rPr>
-                        </m:ctrlPr>
-                      </m:sSubPr>
-                      <m:e>
-                        <m:r>
-                          <a:rPr lang="en-US" sz="2000" b="0" i="1" smtClean="0">
-                            <a:latin typeface="Cambria Math" panose="02040503050406030204" pitchFamily="18" charset="0"/>
-                          </a:rPr>
-                          <m:t>𝑡</m:t>
-                        </m:r>
-                      </m:e>
-                      <m:sub>
-                        <m:f>
-                          <m:fPr>
-                            <m:ctrlPr>
-                              <a:rPr lang="en-US" sz="2000" b="0" i="1" smtClean="0">
-                                <a:latin typeface="Cambria Math" panose="02040503050406030204" pitchFamily="18" charset="0"/>
-                              </a:rPr>
-                            </m:ctrlPr>
-                          </m:fPr>
-                          <m:num>
-                            <m:r>
-                              <a:rPr lang="en-US" sz="2000" b="0" i="1" smtClean="0">
-                                <a:latin typeface="Cambria Math" panose="02040503050406030204" pitchFamily="18" charset="0"/>
-                              </a:rPr>
-                              <m:t>𝛼</m:t>
-                            </m:r>
-                          </m:num>
-                          <m:den>
-                            <m:r>
-                              <a:rPr lang="en-US" sz="2000" b="0" i="1" smtClean="0">
-                                <a:latin typeface="Cambria Math" panose="02040503050406030204" pitchFamily="18" charset="0"/>
-                              </a:rPr>
-                              <m:t>2</m:t>
-                            </m:r>
-                          </m:den>
-                        </m:f>
-                      </m:sub>
-                    </m:sSub>
-                    <m:d>
-                      <m:dPr>
-                        <m:ctrlPr>
-                          <a:rPr lang="en-US" sz="2000" b="0" i="1" smtClean="0">
-                            <a:latin typeface="Cambria Math" panose="02040503050406030204" pitchFamily="18" charset="0"/>
-                          </a:rPr>
-                        </m:ctrlPr>
-                      </m:dPr>
-                      <m:e>
-                        <m:r>
-                          <a:rPr lang="en-US" sz="2000" b="0" i="1" smtClean="0">
-                            <a:latin typeface="Cambria Math" panose="02040503050406030204" pitchFamily="18" charset="0"/>
-                          </a:rPr>
-                          <m:t>𝑛</m:t>
-                        </m:r>
-                        <m:r>
-                          <a:rPr lang="en-US" sz="2000" b="0" i="1" smtClean="0">
-                            <a:latin typeface="Cambria Math" panose="02040503050406030204" pitchFamily="18" charset="0"/>
-                          </a:rPr>
-                          <m:t>−1</m:t>
-                        </m:r>
-                      </m:e>
-                    </m:d>
                     <m:r>
                       <a:rPr lang="en-US" sz="2000" b="0" i="1" smtClean="0">
                         <a:latin typeface="Cambria Math" panose="02040503050406030204" pitchFamily="18" charset="0"/>
@@ -36032,6 +35967,12 @@
                   <a:rPr lang="en-US" sz="2000" dirty="0" smtClean="0">
                     <a:latin typeface="RijksoverheidSansText" panose="020B0503040202060203" pitchFamily="34" charset="0"/>
                   </a:rPr>
+                  <a:t>:</a:t>
+                </a:r>
+                <a:r>
+                  <a:rPr lang="en-US" sz="2000" dirty="0" smtClean="0">
+                    <a:latin typeface="RijksoverheidSansText" panose="020B0503040202060203" pitchFamily="34" charset="0"/>
+                  </a:rPr>
                   <a:t> </a:t>
                 </a:r>
                 <a:r>
@@ -36119,10 +36060,10 @@
                       <m:t>𝑡</m:t>
                     </m:r>
                     <m:r>
-                      <a:rPr lang="en-US" sz="2000" b="0" i="1" smtClean="0">
+                      <a:rPr lang="nl-NL" sz="2000" b="0" i="1" smtClean="0">
                         <a:latin typeface="Cambria Math" panose="02040503050406030204" pitchFamily="18" charset="0"/>
                       </a:rPr>
-                      <m:t>∗</m:t>
+                      <m:t>⋅</m:t>
                     </m:r>
                     <m:f>
                       <m:fPr>
@@ -36170,6 +36111,12 @@
                     </m:r>
                   </m:oMath>
                 </a14:m>
+                <a:r>
+                  <a:rPr lang="en-US" sz="2000" dirty="0" smtClean="0">
+                    <a:latin typeface="RijksoverheidSansText" panose="020B0503040202060203" pitchFamily="34" charset="0"/>
+                  </a:rPr>
+                  <a:t>?</a:t>
+                </a:r>
                 <a:endParaRPr lang="en-US" sz="2000" dirty="0" smtClean="0">
                   <a:latin typeface="RijksoverheidSansText" panose="020B0503040202060203" pitchFamily="34" charset="0"/>
                 </a:endParaRPr>
@@ -36184,19 +36131,7 @@
                   <a:rPr lang="en-US" sz="2000" dirty="0" err="1" smtClean="0">
                     <a:latin typeface="RijksoverheidSansText" panose="020B0503040202060203" pitchFamily="34" charset="0"/>
                   </a:rPr>
-                  <a:t>Probeer</a:t>
-                </a:r>
-                <a:r>
-                  <a:rPr lang="en-US" sz="2000" dirty="0" smtClean="0">
-                    <a:latin typeface="RijksoverheidSansText" panose="020B0503040202060203" pitchFamily="34" charset="0"/>
-                  </a:rPr>
-                  <a:t> – met trial </a:t>
-                </a:r>
-                <a:r>
-                  <a:rPr lang="en-US" sz="2000" dirty="0" err="1" smtClean="0">
-                    <a:latin typeface="RijksoverheidSansText" panose="020B0503040202060203" pitchFamily="34" charset="0"/>
-                  </a:rPr>
-                  <a:t>en</a:t>
+                  <a:t>Maak</a:t>
                 </a:r>
                 <a:r>
                   <a:rPr lang="en-US" sz="2000" dirty="0" smtClean="0">
@@ -36205,34 +36140,40 @@
                   <a:t> </a:t>
                 </a:r>
                 <a:r>
+                  <a:rPr lang="en-US" sz="2000" dirty="0" err="1" smtClean="0">
+                    <a:latin typeface="RijksoverheidSansText" panose="020B0503040202060203" pitchFamily="34" charset="0"/>
+                  </a:rPr>
+                  <a:t>een</a:t>
+                </a:r>
+                <a:r>
                   <a:rPr lang="en-US" sz="2000" dirty="0" smtClean="0">
                     <a:latin typeface="RijksoverheidSansText" panose="020B0503040202060203" pitchFamily="34" charset="0"/>
                   </a:rPr>
-                  <a:t>error, of de </a:t>
+                  <a:t> GR </a:t>
                 </a:r>
                 <a:r>
                   <a:rPr lang="en-US" sz="2000" dirty="0" err="1" smtClean="0">
                     <a:latin typeface="RijksoverheidSansText" panose="020B0503040202060203" pitchFamily="34" charset="0"/>
                   </a:rPr>
-                  <a:t>tabeloptie</a:t>
+                  <a:t>tabel</a:t>
                 </a:r>
                 <a:r>
                   <a:rPr lang="en-US" sz="2000" dirty="0" smtClean="0">
                     <a:latin typeface="RijksoverheidSansText" panose="020B0503040202060203" pitchFamily="34" charset="0"/>
                   </a:rPr>
-                  <a:t> </a:t>
-                </a:r>
-                <a:r>
-                  <a:rPr lang="en-US" sz="2000" dirty="0" smtClean="0">
-                    <a:latin typeface="RijksoverheidSansText" panose="020B0503040202060203" pitchFamily="34" charset="0"/>
-                  </a:rPr>
-                  <a:t>– </a:t>
+                  <a:t> met </a:t>
                 </a:r>
                 <a:r>
                   <a:rPr lang="en-US" sz="2000" dirty="0" err="1" smtClean="0">
                     <a:latin typeface="RijksoverheidSansText" panose="020B0503040202060203" pitchFamily="34" charset="0"/>
                   </a:rPr>
-                  <a:t>verschillende</a:t>
+                  <a:t>verschill</a:t>
+                </a:r>
+                <a:r>
+                  <a:rPr lang="en-US" sz="2000" dirty="0" err="1" smtClean="0">
+                    <a:latin typeface="RijksoverheidSansText" panose="020B0503040202060203" pitchFamily="34" charset="0"/>
+                  </a:rPr>
+                  <a:t>ende</a:t>
                 </a:r>
                 <a:r>
                   <a:rPr lang="en-US" sz="2000" dirty="0" smtClean="0">
@@ -36272,8 +36213,142 @@
                       </a:rPr>
                       <m:t>𝑛</m:t>
                     </m:r>
+                  </m:oMath>
+                </a14:m>
+                <a:r>
+                  <a:rPr lang="en-US" sz="2000" b="0" dirty="0" smtClean="0">
+                    <a:latin typeface="RijksoverheidSansText" panose="020B0503040202060203" pitchFamily="34" charset="0"/>
+                  </a:rPr>
+                  <a:t> met </a:t>
+                </a:r>
+                <a14:m>
+                  <m:oMath xmlns:m="http://schemas.openxmlformats.org/officeDocument/2006/math">
+                    <m:sSub>
+                      <m:sSubPr>
+                        <m:ctrlPr>
+                          <a:rPr lang="nl-NL" sz="2000" b="0" i="1" dirty="0" smtClean="0">
+                            <a:latin typeface="Cambria Math" panose="02040503050406030204" pitchFamily="18" charset="0"/>
+                          </a:rPr>
+                        </m:ctrlPr>
+                      </m:sSubPr>
+                      <m:e>
+                        <m:r>
+                          <a:rPr lang="nl-NL" sz="2000" b="0" i="1" dirty="0" smtClean="0">
+                            <a:latin typeface="Cambria Math" panose="02040503050406030204" pitchFamily="18" charset="0"/>
+                          </a:rPr>
+                          <m:t>𝑦</m:t>
+                        </m:r>
+                      </m:e>
+                      <m:sub>
+                        <m:r>
+                          <a:rPr lang="nl-NL" sz="2000" b="0" i="1" dirty="0" smtClean="0">
+                            <a:latin typeface="Cambria Math" panose="02040503050406030204" pitchFamily="18" charset="0"/>
+                          </a:rPr>
+                          <m:t>1</m:t>
+                        </m:r>
+                      </m:sub>
+                    </m:sSub>
                     <m:r>
-                      <a:rPr lang="en-US" sz="2000" b="0" i="1" smtClean="0">
+                      <a:rPr lang="nl-NL" sz="2000" b="0" i="1" dirty="0" smtClean="0">
+                        <a:latin typeface="Cambria Math" panose="02040503050406030204" pitchFamily="18" charset="0"/>
+                      </a:rPr>
+                      <m:t>=</m:t>
+                    </m:r>
+                    <m:r>
+                      <m:rPr>
+                        <m:sty m:val="p"/>
+                      </m:rPr>
+                      <a:rPr lang="nl-NL" sz="2000" b="0" i="0" dirty="0" smtClean="0">
+                        <a:latin typeface="Cambria Math" panose="02040503050406030204" pitchFamily="18" charset="0"/>
+                      </a:rPr>
+                      <m:t>InvT</m:t>
+                    </m:r>
+                    <m:d>
+                      <m:dPr>
+                        <m:ctrlPr>
+                          <a:rPr lang="nl-NL" sz="2000" b="0" i="0" dirty="0" smtClean="0">
+                            <a:latin typeface="Cambria Math" panose="02040503050406030204" pitchFamily="18" charset="0"/>
+                          </a:rPr>
+                        </m:ctrlPr>
+                      </m:dPr>
+                      <m:e>
+                        <m:r>
+                          <m:rPr>
+                            <m:sty m:val="p"/>
+                          </m:rPr>
+                          <a:rPr lang="nl-NL" sz="2000" b="0" i="0" dirty="0" smtClean="0">
+                            <a:latin typeface="Cambria Math" panose="02040503050406030204" pitchFamily="18" charset="0"/>
+                          </a:rPr>
+                          <m:t>opp</m:t>
+                        </m:r>
+                        <m:r>
+                          <a:rPr lang="nl-NL" sz="2000" b="0" i="0" dirty="0" smtClean="0">
+                            <a:latin typeface="Cambria Math" panose="02040503050406030204" pitchFamily="18" charset="0"/>
+                          </a:rPr>
+                          <m:t>=1−</m:t>
+                        </m:r>
+                        <m:f>
+                          <m:fPr>
+                            <m:ctrlPr>
+                              <a:rPr lang="nl-NL" sz="2000" b="0" i="1" dirty="0" smtClean="0">
+                                <a:latin typeface="Cambria Math" panose="02040503050406030204" pitchFamily="18" charset="0"/>
+                              </a:rPr>
+                            </m:ctrlPr>
+                          </m:fPr>
+                          <m:num>
+                            <m:r>
+                              <a:rPr lang="nl-NL" sz="2000" b="0" i="1" dirty="0" smtClean="0">
+                                <a:latin typeface="Cambria Math" panose="02040503050406030204" pitchFamily="18" charset="0"/>
+                              </a:rPr>
+                              <m:t>𝛼</m:t>
+                            </m:r>
+                          </m:num>
+                          <m:den>
+                            <m:r>
+                              <a:rPr lang="nl-NL" sz="2000" b="0" i="1" dirty="0" smtClean="0">
+                                <a:latin typeface="Cambria Math" panose="02040503050406030204" pitchFamily="18" charset="0"/>
+                              </a:rPr>
+                              <m:t>2</m:t>
+                            </m:r>
+                          </m:den>
+                        </m:f>
+                        <m:r>
+                          <a:rPr lang="nl-NL" sz="2000" b="0" i="1" dirty="0" smtClean="0">
+                            <a:latin typeface="Cambria Math" panose="02040503050406030204" pitchFamily="18" charset="0"/>
+                          </a:rPr>
+                          <m:t>;</m:t>
+                        </m:r>
+                        <m:r>
+                          <m:rPr>
+                            <m:sty m:val="p"/>
+                          </m:rPr>
+                          <a:rPr lang="nl-NL" sz="2000" b="0" i="0" dirty="0" smtClean="0">
+                            <a:latin typeface="Cambria Math" panose="02040503050406030204" pitchFamily="18" charset="0"/>
+                          </a:rPr>
+                          <m:t>df</m:t>
+                        </m:r>
+                        <m:r>
+                          <a:rPr lang="nl-NL" sz="2000" b="0" i="1" dirty="0" smtClean="0">
+                            <a:latin typeface="Cambria Math" panose="02040503050406030204" pitchFamily="18" charset="0"/>
+                          </a:rPr>
+                          <m:t>=</m:t>
+                        </m:r>
+                        <m:r>
+                          <a:rPr lang="nl-NL" sz="2000" b="0" i="1" dirty="0" smtClean="0">
+                            <a:latin typeface="Cambria Math" panose="02040503050406030204" pitchFamily="18" charset="0"/>
+                          </a:rPr>
+                          <m:t>𝑛</m:t>
+                        </m:r>
+                        <m:r>
+                          <a:rPr lang="nl-NL" sz="2000" b="0" i="1" dirty="0" smtClean="0">
+                            <a:latin typeface="Cambria Math" panose="02040503050406030204" pitchFamily="18" charset="0"/>
+                          </a:rPr>
+                          <m:t>−1</m:t>
+                        </m:r>
+                      </m:e>
+                    </m:d>
+                    <m:r>
+                      <a:rPr lang="nl-NL" sz="2000" b="0" i="0" dirty="0" smtClean="0">
                         <a:latin typeface="Cambria Math" panose="02040503050406030204" pitchFamily="18" charset="0"/>
                       </a:rPr>
                       <m:t>:</m:t>
@@ -36344,6 +36419,21 @@
                       </m:dPr>
                       <m:e>
                         <m:r>
+                          <m:rPr>
+                            <m:sty m:val="p"/>
+                          </m:rPr>
+                          <a:rPr lang="nl-NL" sz="2000" b="0" i="0" smtClean="0">
+                            <a:latin typeface="Cambria Math" panose="02040503050406030204" pitchFamily="18" charset="0"/>
+                          </a:rPr>
+                          <m:t>opp</m:t>
+                        </m:r>
+                        <m:r>
+                          <a:rPr lang="nl-NL" sz="2000" b="0" i="0" smtClean="0">
+                            <a:latin typeface="Cambria Math" panose="02040503050406030204" pitchFamily="18" charset="0"/>
+                          </a:rPr>
+                          <m:t>=</m:t>
+                        </m:r>
+                        <m:r>
                           <a:rPr lang="en-US" sz="2000" b="0" i="1" smtClean="0">
                             <a:latin typeface="Cambria Math" panose="02040503050406030204" pitchFamily="18" charset="0"/>
                           </a:rPr>
@@ -36364,10 +36454,10 @@
                       </m:e>
                     </m:d>
                     <m:r>
-                      <a:rPr lang="en-US" sz="2000" b="0" i="1" smtClean="0">
+                      <a:rPr lang="nl-NL" sz="2000" b="0" i="1" smtClean="0">
                         <a:latin typeface="Cambria Math" panose="02040503050406030204" pitchFamily="18" charset="0"/>
                       </a:rPr>
-                      <m:t>∗</m:t>
+                      <m:t>⋅</m:t>
                     </m:r>
                     <m:f>
                       <m:fPr>
@@ -36479,6 +36569,21 @@
                       </m:dPr>
                       <m:e>
                         <m:r>
+                          <m:rPr>
+                            <m:sty m:val="p"/>
+                          </m:rPr>
+                          <a:rPr lang="nl-NL" sz="2000" b="0" i="0" smtClean="0">
+                            <a:latin typeface="Cambria Math" panose="02040503050406030204" pitchFamily="18" charset="0"/>
+                          </a:rPr>
+                          <m:t>opp</m:t>
+                        </m:r>
+                        <m:r>
+                          <a:rPr lang="nl-NL" sz="2000" b="0" i="0" smtClean="0">
+                            <a:latin typeface="Cambria Math" panose="02040503050406030204" pitchFamily="18" charset="0"/>
+                          </a:rPr>
+                          <m:t>=</m:t>
+                        </m:r>
+                        <m:r>
                           <a:rPr lang="en-US" sz="2000" i="1">
                             <a:latin typeface="Cambria Math" panose="02040503050406030204" pitchFamily="18" charset="0"/>
                           </a:rPr>
@@ -36499,10 +36604,10 @@
                       </m:e>
                     </m:d>
                     <m:r>
-                      <a:rPr lang="en-US" sz="2000" i="1">
+                      <a:rPr lang="nl-NL" sz="2000" b="0" i="1" smtClean="0">
                         <a:latin typeface="Cambria Math" panose="02040503050406030204" pitchFamily="18" charset="0"/>
                       </a:rPr>
-                      <m:t>∗</m:t>
+                      <m:t>⋅</m:t>
                     </m:r>
                     <m:f>
                       <m:fPr>
@@ -36701,7 +36806,7 @@
               <a:blipFill>
                 <a:blip r:embed="rId2"/>
                 <a:stretch>
-                  <a:fillRect l="-1407" t="-1865" r="-394" b="-5452"/>
+                  <a:fillRect l="-1407" t="-1865" r="-394" b="-9182"/>
                 </a:stretch>
               </a:blipFill>
             </p:spPr>
@@ -36710,7 +36815,7 @@
               <a:lstStyle/>
               <a:p>
                 <a:r>
-                  <a:rPr lang="nl-NL">
+                  <a:rPr lang="en-US">
                     <a:noFill/>
                   </a:rPr>
                   <a:t> </a:t>
@@ -37117,13 +37222,34 @@
                   <a:t> we de </a:t>
                 </a:r>
                 <a:r>
-                  <a:rPr lang="en-US" dirty="0" err="1" smtClean="0"/>
+                  <a:rPr lang="en-US" b="1" dirty="0" err="1" smtClean="0">
+                    <a:solidFill>
+                      <a:schemeClr val="accent1"/>
+                    </a:solidFill>
+                  </a:rPr>
                   <a:t>Clopper</a:t>
                 </a:r>
                 <a:r>
+                  <a:rPr lang="en-US" b="1" dirty="0" smtClean="0">
+                    <a:solidFill>
+                      <a:schemeClr val="accent1"/>
+                    </a:solidFill>
+                  </a:rPr>
+                  <a:t>-Pearson </a:t>
+                </a:r>
+                <a:r>
+                  <a:rPr lang="en-US" b="1" dirty="0" err="1" smtClean="0">
+                    <a:solidFill>
+                      <a:schemeClr val="accent1"/>
+                    </a:solidFill>
+                  </a:rPr>
+                  <a:t>methode</a:t>
+                </a:r>
+                <a:r>
                   <a:rPr lang="en-US" dirty="0" smtClean="0"/>
-                  <a:t>-Pearson method:</a:t>
-                </a:r>
+                  <a:t>:</a:t>
+                </a:r>
+                <a:endParaRPr lang="en-US" dirty="0" smtClean="0"/>
               </a:p>
               <a:p>
                 <a:pPr marL="457200" indent="-457200">
@@ -37326,6 +37452,26 @@
               </a:p>
               <a:p>
                 <a:pPr marL="717550" lvl="1" indent="-342900"/>
+                <a:r>
+                  <a:rPr lang="en-US" b="0" dirty="0" smtClean="0"/>
+                  <a:t>De GR solver </a:t>
+                </a:r>
+                <a:r>
+                  <a:rPr lang="en-US" b="0" dirty="0" err="1" smtClean="0"/>
+                  <a:t>optie</a:t>
+                </a:r>
+                <a:r>
+                  <a:rPr lang="en-US" b="0" dirty="0" smtClean="0"/>
+                  <a:t> </a:t>
+                </a:r>
+                <a:r>
+                  <a:rPr lang="en-US" b="0" dirty="0" err="1" smtClean="0"/>
+                  <a:t>geeft</a:t>
+                </a:r>
+                <a:r>
+                  <a:rPr lang="en-US" b="0" dirty="0" smtClean="0"/>
+                  <a:t> </a:t>
+                </a:r>
                 <a14:m>
                   <m:oMath xmlns:m="http://schemas.openxmlformats.org/officeDocument/2006/math">
                     <m:sSub>
@@ -37354,101 +37500,19 @@
                       </m:sub>
                     </m:sSub>
                     <m:r>
-                      <a:rPr lang="en-US" b="0" i="1" smtClean="0">
+                      <a:rPr lang="nl-NL" b="0" i="1" smtClean="0">
                         <a:latin typeface="Cambria Math" panose="02040503050406030204" pitchFamily="18" charset="0"/>
                       </a:rPr>
-                      <m:t>=</m:t>
+                      <m:t>≈</m:t>
                     </m:r>
-                    <m:r>
-                      <m:rPr>
-                        <m:sty m:val="p"/>
-                      </m:rPr>
-                      <a:rPr lang="en-US" b="0" i="0" smtClean="0">
-                        <a:latin typeface="Cambria Math" panose="02040503050406030204" pitchFamily="18" charset="0"/>
-                      </a:rPr>
-                      <m:t>solve</m:t>
-                    </m:r>
-                    <m:d>
-                      <m:dPr>
-                        <m:ctrlPr>
-                          <a:rPr lang="en-US" b="0" i="1" smtClean="0">
-                            <a:latin typeface="Cambria Math" panose="02040503050406030204" pitchFamily="18" charset="0"/>
-                          </a:rPr>
-                        </m:ctrlPr>
-                      </m:dPr>
-                      <m:e>
-                        <m:r>
-                          <m:rPr>
-                            <m:sty m:val="p"/>
-                          </m:rPr>
-                          <a:rPr lang="en-US" b="0" i="0" smtClean="0">
-                            <a:latin typeface="Cambria Math" panose="02040503050406030204" pitchFamily="18" charset="0"/>
-                          </a:rPr>
-                          <m:t>binomcdf</m:t>
-                        </m:r>
-                        <m:d>
-                          <m:dPr>
-                            <m:ctrlPr>
-                              <a:rPr lang="en-US" b="0" i="1" smtClean="0">
-                                <a:latin typeface="Cambria Math" panose="02040503050406030204" pitchFamily="18" charset="0"/>
-                              </a:rPr>
-                            </m:ctrlPr>
-                          </m:dPr>
-                          <m:e>
-                            <m:r>
-                              <a:rPr lang="en-US" b="0" i="0" smtClean="0">
-                                <a:latin typeface="Cambria Math" panose="02040503050406030204" pitchFamily="18" charset="0"/>
-                              </a:rPr>
-                              <m:t>300, </m:t>
-                            </m:r>
-                            <m:r>
-                              <a:rPr lang="en-US" b="0" i="1" smtClean="0">
-                                <a:latin typeface="Cambria Math" panose="02040503050406030204" pitchFamily="18" charset="0"/>
-                              </a:rPr>
-                              <m:t>𝑋</m:t>
-                            </m:r>
-                            <m:r>
-                              <a:rPr lang="en-US" b="0" i="1" smtClean="0">
-                                <a:latin typeface="Cambria Math" panose="02040503050406030204" pitchFamily="18" charset="0"/>
-                              </a:rPr>
-                              <m:t>, 124</m:t>
-                            </m:r>
-                          </m:e>
-                        </m:d>
-                        <m:r>
-                          <a:rPr lang="en-US" b="0" i="1" smtClean="0">
-                            <a:latin typeface="Cambria Math" panose="02040503050406030204" pitchFamily="18" charset="0"/>
-                          </a:rPr>
-                          <m:t>−0,025;</m:t>
-                        </m:r>
-                        <m:r>
-                          <a:rPr lang="en-US" b="0" i="1" smtClean="0">
-                            <a:latin typeface="Cambria Math" panose="02040503050406030204" pitchFamily="18" charset="0"/>
-                          </a:rPr>
-                          <m:t>𝑋</m:t>
-                        </m:r>
-                        <m:r>
-                          <a:rPr lang="en-US" b="0" i="1" smtClean="0">
-                            <a:latin typeface="Cambria Math" panose="02040503050406030204" pitchFamily="18" charset="0"/>
-                          </a:rPr>
-                          <m:t>;0,5</m:t>
-                        </m:r>
-                      </m:e>
-                    </m:d>
                     <m:r>
                       <a:rPr lang="en-US" b="0" i="1" smtClean="0">
                         <a:latin typeface="Cambria Math" panose="02040503050406030204" pitchFamily="18" charset="0"/>
                       </a:rPr>
-                      <m:t>≈0,4714</m:t>
+                      <m:t>0,4714</m:t>
                     </m:r>
                   </m:oMath>
                 </a14:m>
-                <a:endParaRPr lang="en-US" b="0" dirty="0" smtClean="0"/>
-              </a:p>
-              <a:p>
-                <a:pPr lvl="1" indent="0">
-                  <a:buNone/>
-                </a:pPr>
                 <a:endParaRPr lang="en-US" dirty="0"/>
               </a:p>
               <a:p>
@@ -37660,6 +37724,26 @@
               </a:p>
               <a:p>
                 <a:pPr marL="717550" lvl="1" indent="-342900"/>
+                <a:r>
+                  <a:rPr lang="en-US" dirty="0" smtClean="0"/>
+                  <a:t>De GR solver </a:t>
+                </a:r>
+                <a:r>
+                  <a:rPr lang="en-US" dirty="0" err="1" smtClean="0"/>
+                  <a:t>optie</a:t>
+                </a:r>
+                <a:r>
+                  <a:rPr lang="en-US" dirty="0" smtClean="0"/>
+                  <a:t> </a:t>
+                </a:r>
+                <a:r>
+                  <a:rPr lang="en-US" dirty="0" err="1" smtClean="0"/>
+                  <a:t>geeft</a:t>
+                </a:r>
+                <a:r>
+                  <a:rPr lang="en-US" dirty="0" smtClean="0"/>
+                  <a:t> </a:t>
+                </a:r>
                 <a14:m>
                   <m:oMath xmlns:m="http://schemas.openxmlformats.org/officeDocument/2006/math">
                     <m:sSub>
@@ -37691,94 +37775,6 @@
                       <a:rPr lang="en-US" i="1">
                         <a:latin typeface="Cambria Math" panose="02040503050406030204" pitchFamily="18" charset="0"/>
                       </a:rPr>
-                      <m:t>=</m:t>
-                    </m:r>
-                    <m:r>
-                      <m:rPr>
-                        <m:sty m:val="p"/>
-                      </m:rPr>
-                      <a:rPr lang="en-US">
-                        <a:latin typeface="Cambria Math" panose="02040503050406030204" pitchFamily="18" charset="0"/>
-                      </a:rPr>
-                      <m:t>solve</m:t>
-                    </m:r>
-                    <m:d>
-                      <m:dPr>
-                        <m:ctrlPr>
-                          <a:rPr lang="en-US" i="1">
-                            <a:latin typeface="Cambria Math" panose="02040503050406030204" pitchFamily="18" charset="0"/>
-                          </a:rPr>
-                        </m:ctrlPr>
-                      </m:dPr>
-                      <m:e>
-                        <m:r>
-                          <a:rPr lang="en-US" b="0" i="1" smtClean="0">
-                            <a:latin typeface="Cambria Math" panose="02040503050406030204" pitchFamily="18" charset="0"/>
-                          </a:rPr>
-                          <m:t>1−</m:t>
-                        </m:r>
-                        <m:r>
-                          <m:rPr>
-                            <m:sty m:val="p"/>
-                          </m:rPr>
-                          <a:rPr lang="en-US">
-                            <a:latin typeface="Cambria Math" panose="02040503050406030204" pitchFamily="18" charset="0"/>
-                          </a:rPr>
-                          <m:t>binomcdf</m:t>
-                        </m:r>
-                        <m:d>
-                          <m:dPr>
-                            <m:ctrlPr>
-                              <a:rPr lang="en-US" i="1">
-                                <a:latin typeface="Cambria Math" panose="02040503050406030204" pitchFamily="18" charset="0"/>
-                              </a:rPr>
-                            </m:ctrlPr>
-                          </m:dPr>
-                          <m:e>
-                            <m:r>
-                              <a:rPr lang="en-US">
-                                <a:latin typeface="Cambria Math" panose="02040503050406030204" pitchFamily="18" charset="0"/>
-                              </a:rPr>
-                              <m:t>300, </m:t>
-                            </m:r>
-                            <m:r>
-                              <a:rPr lang="en-US" i="1">
-                                <a:latin typeface="Cambria Math" panose="02040503050406030204" pitchFamily="18" charset="0"/>
-                              </a:rPr>
-                              <m:t>𝑋</m:t>
-                            </m:r>
-                            <m:r>
-                              <a:rPr lang="en-US" i="1">
-                                <a:latin typeface="Cambria Math" panose="02040503050406030204" pitchFamily="18" charset="0"/>
-                              </a:rPr>
-                              <m:t>, 123</m:t>
-                            </m:r>
-                          </m:e>
-                        </m:d>
-                        <m:r>
-                          <a:rPr lang="en-US" i="1">
-                            <a:latin typeface="Cambria Math" panose="02040503050406030204" pitchFamily="18" charset="0"/>
-                          </a:rPr>
-                          <m:t>−0,025;</m:t>
-                        </m:r>
-                        <m:r>
-                          <a:rPr lang="en-US" i="1">
-                            <a:latin typeface="Cambria Math" panose="02040503050406030204" pitchFamily="18" charset="0"/>
-                          </a:rPr>
-                          <m:t>𝑋</m:t>
-                        </m:r>
-                        <m:r>
-                          <a:rPr lang="en-US" i="1">
-                            <a:latin typeface="Cambria Math" panose="02040503050406030204" pitchFamily="18" charset="0"/>
-                          </a:rPr>
-                          <m:t>;0,5</m:t>
-                        </m:r>
-                      </m:e>
-                    </m:d>
-                    <m:r>
-                      <a:rPr lang="en-US" i="1">
-                        <a:latin typeface="Cambria Math" panose="02040503050406030204" pitchFamily="18" charset="0"/>
-                      </a:rPr>
                       <m:t>≈</m:t>
                     </m:r>
                     <m:r>
@@ -37792,6 +37788,10 @@
                 <a:endParaRPr lang="en-US" b="0" dirty="0" smtClean="0"/>
               </a:p>
               <a:p>
+                <a:pPr marL="717550" lvl="1" indent="-342900"/>
+                <a:endParaRPr lang="en-US" b="0" dirty="0" smtClean="0"/>
+              </a:p>
+              <a:p>
                 <a:pPr lvl="1" indent="0">
                   <a:buNone/>
                 </a:pPr>
@@ -37835,7 +37835,11 @@
                 </a:r>
                 <a:r>
                   <a:rPr lang="en-US" b="1" dirty="0" smtClean="0"/>
-                  <a:t>-Pearson): </a:t>
+                  <a:t>-Pearson</a:t>
+                </a:r>
+                <a:r>
+                  <a:rPr lang="en-US" b="1" dirty="0" smtClean="0"/>
+                  <a:t>):	 </a:t>
                 </a:r>
                 <a14:m>
                   <m:oMath xmlns:m="http://schemas.openxmlformats.org/officeDocument/2006/math">
@@ -37945,7 +37949,7 @@
               <a:lstStyle/>
               <a:p>
                 <a:r>
-                  <a:rPr lang="nl-NL">
+                  <a:rPr lang="en-US">
                     <a:noFill/>
                   </a:rPr>
                   <a:t> </a:t>
@@ -38679,60 +38683,22 @@
                   <a:buChar char="•"/>
                 </a:pPr>
                 <a:r>
-                  <a:rPr lang="en-US" sz="2400" dirty="0" err="1">
+                  <a:rPr lang="en-US" sz="2400" dirty="0" err="1" smtClean="0">
                     <a:latin typeface="RijksoverheidSansText" panose="020B0503040202060203" pitchFamily="34" charset="0"/>
                   </a:rPr>
                   <a:t>Hoofdstuk</a:t>
                 </a:r>
                 <a:r>
-                  <a:rPr lang="en-US" sz="2400" dirty="0">
-                    <a:latin typeface="RijksoverheidSansText" panose="020B0503040202060203" pitchFamily="34" charset="0"/>
-                  </a:rPr>
-                  <a:t> </a:t>
-                </a:r>
-                <a:r>
                   <a:rPr lang="en-US" sz="2400" dirty="0" smtClean="0">
                     <a:latin typeface="RijksoverheidSansText" panose="020B0503040202060203" pitchFamily="34" charset="0"/>
                   </a:rPr>
-                  <a:t>8: m3, m4, m6, 8.2, 8.6, 8.7, </a:t>
-                </a:r>
-                <a:r>
-                  <a:rPr lang="en-US" sz="2400" dirty="0" smtClean="0">
-                    <a:latin typeface="RijksoverheidSansText" panose="020B0503040202060203" pitchFamily="34" charset="0"/>
-                  </a:rPr>
-                  <a:t>8.8, 8.12, 8.13</a:t>
-                </a:r>
-                <a:r>
-                  <a:rPr lang="en-US" sz="2400" dirty="0" smtClean="0">
-                    <a:latin typeface="RijksoverheidSansText" panose="020B0503040202060203" pitchFamily="34" charset="0"/>
-                  </a:rPr>
-                  <a:t>, </a:t>
-                </a:r>
-                <a:r>
-                  <a:rPr lang="en-US" sz="2400" dirty="0" smtClean="0">
-                    <a:latin typeface="RijksoverheidSansText" panose="020B0503040202060203" pitchFamily="34" charset="0"/>
-                  </a:rPr>
-                  <a:t>8.14, 8.18 (</a:t>
-                </a:r>
-                <a:r>
-                  <a:rPr lang="en-US" sz="2400" dirty="0" err="1" smtClean="0">
-                    <a:latin typeface="RijksoverheidSansText" panose="020B0503040202060203" pitchFamily="34" charset="0"/>
-                  </a:rPr>
-                  <a:t>voorwaarde</a:t>
-                </a:r>
-                <a:r>
-                  <a:rPr lang="en-US" sz="2400" smtClean="0">
-                    <a:latin typeface="RijksoverheidSansText" panose="020B0503040202060203" pitchFamily="34" charset="0"/>
-                  </a:rPr>
-                  <a:t> 1,3)</a:t>
-                </a:r>
-                <a:endParaRPr lang="en-US" sz="2400" dirty="0">
-                  <a:latin typeface="RijksoverheidSansText" panose="020B0503040202060203" pitchFamily="34" charset="0"/>
-                </a:endParaRPr>
+                  <a:t> 8: m4, m6, 8.2, 8.6, 8.7, 8.8ac, 8.13, 8.14, 8.18, 8.19</a:t>
+                </a:r>
+                <a:endParaRPr lang="en-US" sz="2400" dirty="0" smtClean="0"/>
               </a:p>
               <a:p>
                 <a:pPr eaLnBrk="1" hangingPunct="1"/>
-                <a:endParaRPr lang="en-US" sz="2400" dirty="0"/>
+                <a:endParaRPr lang="en-US" sz="2400" b="1" dirty="0" smtClean="0"/>
               </a:p>
               <a:p>
                 <a:pPr eaLnBrk="1" hangingPunct="1"/>
@@ -38742,7 +38708,11 @@
                 </a:r>
                 <a:r>
                   <a:rPr lang="en-US" sz="2400" b="1" dirty="0" smtClean="0"/>
-                  <a:t> les: </a:t>
+                  <a:t> </a:t>
+                </a:r>
+                <a:r>
+                  <a:rPr lang="en-US" sz="2400" b="1" dirty="0" smtClean="0"/>
+                  <a:t>les: </a:t>
                 </a:r>
                 <a:r>
                   <a:rPr lang="en-US" sz="2400" dirty="0" err="1" smtClean="0"/>
@@ -38772,7 +38742,7 @@
               <a:blipFill>
                 <a:blip r:embed="rId2"/>
                 <a:stretch>
-                  <a:fillRect l="-1700" t="-2296" r="-850" b="-3300"/>
+                  <a:fillRect l="-1700" t="-2296" b="-3300"/>
                 </a:stretch>
               </a:blipFill>
             </p:spPr>
@@ -38781,7 +38751,7 @@
               <a:lstStyle/>
               <a:p>
                 <a:r>
-                  <a:rPr lang="nl-NL">
+                  <a:rPr lang="en-US">
                     <a:noFill/>
                   </a:rPr>
                   <a:t> </a:t>
@@ -38866,7 +38836,7 @@
                 <a:tabLst/>
                 <a:defRPr/>
               </a:pPr>
-              <a:t>5 juni 2025</a:t>
+              <a:t>16 juni 2025</a:t>
             </a:fld>
             <a:endParaRPr kumimoji="0" lang="nl-NL" sz="1100" b="0" i="0" u="none" strike="noStrike" kern="1200" cap="none" spc="0" normalizeH="0" baseline="0" noProof="0" smtClean="0">
               <a:ln>
@@ -39935,8 +39905,8 @@
           </p:sp>
         </mc:Fallback>
       </mc:AlternateContent>
-      <mc:AlternateContent xmlns:mc="http://schemas.openxmlformats.org/markup-compatibility/2006">
-        <mc:Choice xmlns:a14="http://schemas.microsoft.com/office/drawing/2010/main" Requires="a14">
+      <mc:AlternateContent xmlns:mc="http://schemas.openxmlformats.org/markup-compatibility/2006" xmlns:a14="http://schemas.microsoft.com/office/drawing/2010/main">
+        <mc:Choice Requires="a14">
           <p:sp>
             <p:nvSpPr>
               <p:cNvPr id="2" name="Content Placeholder 1"/>
@@ -40150,7 +40120,6 @@
                   <a:rPr lang="en-US" sz="2400" dirty="0" smtClean="0"/>
                   <a:t> seconden.</a:t>
                 </a:r>
-                <a:endParaRPr lang="en-US" sz="2400" dirty="0" smtClean="0"/>
               </a:p>
               <a:p>
                 <a:endParaRPr lang="en-US" sz="2400" dirty="0"/>
@@ -40174,11 +40143,7 @@
                 </a:r>
                 <a:r>
                   <a:rPr lang="en-US" sz="2400" dirty="0" smtClean="0"/>
-                  <a:t> </a:t>
-                </a:r>
-                <a:r>
-                  <a:rPr lang="en-US" sz="2400" dirty="0" smtClean="0"/>
-                  <a:t>van </a:t>
+                  <a:t> van </a:t>
                 </a:r>
                 <a:r>
                   <a:rPr lang="en-US" sz="2400" dirty="0" err="1" smtClean="0"/>
@@ -40202,11 +40167,7 @@
                 </a:r>
                 <a:r>
                   <a:rPr lang="en-US" sz="2400" dirty="0" smtClean="0"/>
-                  <a:t> </a:t>
-                </a:r>
-                <a:r>
-                  <a:rPr lang="en-US" sz="2400" dirty="0" smtClean="0"/>
-                  <a:t>is </a:t>
+                  <a:t> is </a:t>
                 </a:r>
                 <a:r>
                   <a:rPr lang="en-US" sz="2400" dirty="0" err="1" smtClean="0"/>
@@ -40417,7 +40378,7 @@
             </p:txBody>
           </p:sp>
         </mc:Choice>
-        <mc:Fallback>
+        <mc:Fallback xmlns="">
           <p:sp>
             <p:nvSpPr>
               <p:cNvPr id="2" name="Content Placeholder 1"/>
@@ -40530,7 +40491,7 @@
                 <a:tabLst/>
                 <a:defRPr/>
               </a:pPr>
-              <a:t>5 juni 2025</a:t>
+              <a:t>16 juni 2025</a:t>
             </a:fld>
             <a:endParaRPr kumimoji="0" lang="nl-NL" sz="1100" b="0" i="0" u="none" strike="noStrike" kern="1200" cap="none" spc="0" normalizeH="0" baseline="0" noProof="0" dirty="0" smtClean="0">
               <a:ln>
@@ -40663,8 +40624,8 @@
           <a:chExt cx="0" cy="0"/>
         </a:xfrm>
       </p:grpSpPr>
-      <mc:AlternateContent xmlns:mc="http://schemas.openxmlformats.org/markup-compatibility/2006" xmlns:a14="http://schemas.microsoft.com/office/drawing/2010/main">
-        <mc:Choice Requires="a14">
+      <mc:AlternateContent xmlns:mc="http://schemas.openxmlformats.org/markup-compatibility/2006">
+        <mc:Choice xmlns:a14="http://schemas.microsoft.com/office/drawing/2010/main" Requires="a14">
           <p:sp>
             <p:nvSpPr>
               <p:cNvPr id="6146" name="Title 1"/>
@@ -40675,40 +40636,70 @@
                 <p:ph type="title"/>
               </p:nvPr>
             </p:nvSpPr>
-            <p:spPr/>
+            <p:spPr>
+              <a:xfrm>
+                <a:off x="814917" y="1265239"/>
+                <a:ext cx="10363200" cy="400110"/>
+              </a:xfrm>
+            </p:spPr>
             <p:txBody>
               <a:bodyPr/>
               <a:lstStyle/>
               <a:p>
-                <a:pPr eaLnBrk="1" hangingPunct="1"/>
+                <a:r>
+                  <a:rPr lang="en-US" dirty="0" err="1"/>
+                  <a:t>I</a:t>
+                </a:r>
+                <a:r>
+                  <a:rPr lang="en-US" dirty="0" err="1" smtClean="0"/>
+                  <a:t>ntervalschatting</a:t>
+                </a:r>
                 <a:r>
                   <a:rPr lang="en-US" dirty="0" smtClean="0"/>
-                  <a:t>Student’s </a:t>
+                  <a:t> </a:t>
+                </a:r>
+                <a:r>
+                  <a:rPr lang="en-US" dirty="0" err="1"/>
+                  <a:t>voor</a:t>
+                </a:r>
+                <a:r>
+                  <a:rPr lang="en-US" dirty="0"/>
+                  <a:t> het gemiddelde </a:t>
                 </a:r>
                 <a14:m>
                   <m:oMath xmlns:m="http://schemas.openxmlformats.org/officeDocument/2006/math">
                     <m:r>
-                      <a:rPr lang="en-US" b="0" i="1" dirty="0" smtClean="0">
+                      <a:rPr lang="en-US" i="1">
                         <a:latin typeface="Cambria Math" panose="02040503050406030204" pitchFamily="18" charset="0"/>
                       </a:rPr>
-                      <m:t>𝑡</m:t>
+                      <m:t>𝜇</m:t>
                     </m:r>
                   </m:oMath>
                 </a14:m>
                 <a:r>
-                  <a:rPr lang="en-US" dirty="0" smtClean="0"/>
-                  <a:t>-</a:t>
-                </a:r>
-                <a:r>
-                  <a:rPr lang="en-US" dirty="0" err="1" smtClean="0"/>
-                  <a:t>verdeling</a:t>
+                  <a:rPr lang="nl-NL" dirty="0"/>
+                  <a:t> (voor onbekende </a:t>
+                </a:r>
+                <a14:m>
+                  <m:oMath xmlns:m="http://schemas.openxmlformats.org/officeDocument/2006/math">
+                    <m:r>
+                      <a:rPr lang="en-US" i="1">
+                        <a:latin typeface="Cambria Math" panose="02040503050406030204" pitchFamily="18" charset="0"/>
+                      </a:rPr>
+                      <m:t>𝜎</m:t>
+                    </m:r>
+                  </m:oMath>
+                </a14:m>
+                <a:r>
+                  <a:rPr lang="nl-NL" dirty="0" smtClean="0"/>
+                  <a:t>)</a:t>
                 </a:r>
                 <a:endParaRPr lang="nl-NL" dirty="0" smtClean="0"/>
               </a:p>
             </p:txBody>
           </p:sp>
         </mc:Choice>
-        <mc:Fallback xmlns="">
+        <mc:Fallback>
           <p:sp>
             <p:nvSpPr>
               <p:cNvPr id="6146" name="Title 1"/>
@@ -40720,6 +40711,10 @@
               </p:nvPr>
             </p:nvSpPr>
             <p:spPr>
+              <a:xfrm>
+                <a:off x="814917" y="1265239"/>
+                <a:ext cx="10363200" cy="400110"/>
+              </a:xfrm>
               <a:blipFill>
                 <a:blip r:embed="rId2"/>
                 <a:stretch>
@@ -40732,7 +40727,7 @@
               <a:lstStyle/>
               <a:p>
                 <a:r>
-                  <a:rPr lang="nl-NL">
+                  <a:rPr lang="en-US">
                     <a:noFill/>
                   </a:rPr>
                   <a:t> </a:t>
@@ -41462,17 +41457,42 @@
                         </a:rPr>
                         <m:t>−</m:t>
                       </m:r>
+                      <m:sSub>
+                        <m:sSubPr>
+                          <m:ctrlPr>
+                            <a:rPr lang="nl-NL" i="1">
+                              <a:latin typeface="Cambria Math" panose="02040503050406030204" pitchFamily="18" charset="0"/>
+                            </a:rPr>
+                          </m:ctrlPr>
+                        </m:sSubPr>
+                        <m:e>
+                          <m:r>
+                            <a:rPr lang="nl-NL" i="1">
+                              <a:latin typeface="Cambria Math" panose="02040503050406030204" pitchFamily="18" charset="0"/>
+                            </a:rPr>
+                            <m:t>𝑧</m:t>
+                          </m:r>
+                        </m:e>
+                        <m:sub>
+                          <m:r>
+                            <a:rPr lang="nl-NL" i="1">
+                              <a:latin typeface="Cambria Math" panose="02040503050406030204" pitchFamily="18" charset="0"/>
+                            </a:rPr>
+                            <m:t>𝛼</m:t>
+                          </m:r>
+                          <m:r>
+                            <a:rPr lang="nl-NL" i="1">
+                              <a:latin typeface="Cambria Math" panose="02040503050406030204" pitchFamily="18" charset="0"/>
+                            </a:rPr>
+                            <m:t>/2</m:t>
+                          </m:r>
+                        </m:sub>
+                      </m:sSub>
                       <m:r>
-                        <a:rPr lang="en-US" i="1">
+                        <a:rPr lang="nl-NL" b="0" i="1" smtClean="0">
                           <a:latin typeface="Cambria Math" panose="02040503050406030204" pitchFamily="18" charset="0"/>
                         </a:rPr>
-                        <m:t>𝑧</m:t>
-                      </m:r>
-                      <m:r>
-                        <a:rPr lang="en-US" i="1">
-                          <a:latin typeface="Cambria Math" panose="02040503050406030204" pitchFamily="18" charset="0"/>
-                        </a:rPr>
-                        <m:t>∗</m:t>
+                        <m:t>⋅</m:t>
                       </m:r>
                       <m:f>
                         <m:fPr>
@@ -41542,17 +41562,42 @@
                         </a:rPr>
                         <m:t>+</m:t>
                       </m:r>
+                      <m:sSub>
+                        <m:sSubPr>
+                          <m:ctrlPr>
+                            <a:rPr lang="nl-NL" b="0" i="1" smtClean="0">
+                              <a:latin typeface="Cambria Math" panose="02040503050406030204" pitchFamily="18" charset="0"/>
+                            </a:rPr>
+                          </m:ctrlPr>
+                        </m:sSubPr>
+                        <m:e>
+                          <m:r>
+                            <a:rPr lang="nl-NL" b="0" i="1" smtClean="0">
+                              <a:latin typeface="Cambria Math" panose="02040503050406030204" pitchFamily="18" charset="0"/>
+                            </a:rPr>
+                            <m:t>𝑧</m:t>
+                          </m:r>
+                        </m:e>
+                        <m:sub>
+                          <m:r>
+                            <a:rPr lang="nl-NL" b="0" i="1" smtClean="0">
+                              <a:latin typeface="Cambria Math" panose="02040503050406030204" pitchFamily="18" charset="0"/>
+                            </a:rPr>
+                            <m:t>𝛼</m:t>
+                          </m:r>
+                          <m:r>
+                            <a:rPr lang="nl-NL" b="0" i="1" smtClean="0">
+                              <a:latin typeface="Cambria Math" panose="02040503050406030204" pitchFamily="18" charset="0"/>
+                            </a:rPr>
+                            <m:t>/2</m:t>
+                          </m:r>
+                        </m:sub>
+                      </m:sSub>
                       <m:r>
-                        <a:rPr lang="en-US" i="1">
+                        <a:rPr lang="nl-NL" b="0" i="1" smtClean="0">
                           <a:latin typeface="Cambria Math" panose="02040503050406030204" pitchFamily="18" charset="0"/>
                         </a:rPr>
-                        <m:t>𝑧</m:t>
-                      </m:r>
-                      <m:r>
-                        <a:rPr lang="en-US" i="1">
-                          <a:latin typeface="Cambria Math" panose="02040503050406030204" pitchFamily="18" charset="0"/>
-                        </a:rPr>
-                        <m:t>∗</m:t>
+                        <m:t>⋅</m:t>
                       </m:r>
                       <m:f>
                         <m:fPr>
@@ -41676,7 +41721,7 @@
               <a:lstStyle/>
               <a:p>
                 <a:r>
-                  <a:rPr lang="nl-NL">
+                  <a:rPr lang="en-US">
                     <a:noFill/>
                   </a:rPr>
                   <a:t> </a:t>
@@ -41761,7 +41806,7 @@
                 <a:tabLst/>
                 <a:defRPr/>
               </a:pPr>
-              <a:t>5 juni 2025</a:t>
+              <a:t>16 juni 2025</a:t>
             </a:fld>
             <a:endParaRPr kumimoji="0" lang="nl-NL" sz="1100" b="0" i="0" u="none" strike="noStrike" kern="1200" cap="none" spc="0" normalizeH="0" baseline="0" noProof="0" dirty="0" smtClean="0">
               <a:ln>
@@ -41973,8 +42018,8 @@
           </p:sp>
         </mc:Fallback>
       </mc:AlternateContent>
-      <mc:AlternateContent xmlns:mc="http://schemas.openxmlformats.org/markup-compatibility/2006">
-        <mc:Choice xmlns:a14="http://schemas.microsoft.com/office/drawing/2010/main" Requires="a14">
+      <mc:AlternateContent xmlns:mc="http://schemas.openxmlformats.org/markup-compatibility/2006" xmlns:a14="http://schemas.microsoft.com/office/drawing/2010/main">
+        <mc:Choice Requires="a14">
           <p:sp>
             <p:nvSpPr>
               <p:cNvPr id="2" name="Content Placeholder 1"/>
@@ -42337,7 +42382,7 @@
             </p:txBody>
           </p:sp>
         </mc:Choice>
-        <mc:Fallback>
+        <mc:Fallback xmlns="">
           <p:sp>
             <p:nvSpPr>
               <p:cNvPr id="2" name="Content Placeholder 1"/>
@@ -42450,7 +42495,7 @@
                 <a:tabLst/>
                 <a:defRPr/>
               </a:pPr>
-              <a:t>5 juni 2025</a:t>
+              <a:t>16 juni 2025</a:t>
             </a:fld>
             <a:endParaRPr kumimoji="0" lang="nl-NL" sz="1100" b="0" i="0" u="none" strike="noStrike" kern="1200" cap="none" spc="0" normalizeH="0" baseline="0" noProof="0" dirty="0" smtClean="0">
               <a:ln>
@@ -42832,7 +42877,7 @@
                 <a:tabLst/>
                 <a:defRPr/>
               </a:pPr>
-              <a:t>5 juni 2025</a:t>
+              <a:t>16 juni 2025</a:t>
             </a:fld>
             <a:endParaRPr kumimoji="0" lang="nl-NL" sz="1100" b="0" i="0" u="none" strike="noStrike" kern="1200" cap="none" spc="0" normalizeH="0" baseline="0" noProof="0" dirty="0" smtClean="0">
               <a:ln>

</xml_diff>